<commit_message>
powerpoint jetblack 2 seguridad
</commit_message>
<xml_diff>
--- a/trabajos.inacap.2019/Seguridad y auditoria informática/Unidad 2/Problematica - Empresa JetBlack II.pptx
+++ b/trabajos.inacap.2019/Seguridad y auditoria informática/Unidad 2/Problematica - Empresa JetBlack II.pptx
@@ -6,29 +6,27 @@
     <p:sldMasterId id="2147483662" r:id="rId5"/>
   </p:sldMasterIdLst>
   <p:notesMasterIdLst>
-    <p:notesMasterId r:id="rId21"/>
+    <p:notesMasterId r:id="rId19"/>
   </p:notesMasterIdLst>
   <p:sldIdLst>
     <p:sldId id="256" r:id="rId6"/>
     <p:sldId id="262" r:id="rId7"/>
-    <p:sldId id="268" r:id="rId8"/>
-    <p:sldId id="263" r:id="rId9"/>
-    <p:sldId id="264" r:id="rId10"/>
-    <p:sldId id="267" r:id="rId11"/>
-    <p:sldId id="272" r:id="rId12"/>
-    <p:sldId id="273" r:id="rId13"/>
-    <p:sldId id="274" r:id="rId14"/>
-    <p:sldId id="275" r:id="rId15"/>
-    <p:sldId id="265" r:id="rId16"/>
-    <p:sldId id="270" r:id="rId17"/>
-    <p:sldId id="271" r:id="rId18"/>
-    <p:sldId id="266" r:id="rId19"/>
-    <p:sldId id="269" r:id="rId20"/>
+    <p:sldId id="263" r:id="rId8"/>
+    <p:sldId id="264" r:id="rId9"/>
+    <p:sldId id="267" r:id="rId10"/>
+    <p:sldId id="272" r:id="rId11"/>
+    <p:sldId id="273" r:id="rId12"/>
+    <p:sldId id="274" r:id="rId13"/>
+    <p:sldId id="275" r:id="rId14"/>
+    <p:sldId id="265" r:id="rId15"/>
+    <p:sldId id="270" r:id="rId16"/>
+    <p:sldId id="271" r:id="rId17"/>
+    <p:sldId id="266" r:id="rId18"/>
   </p:sldIdLst>
   <p:sldSz cx="9144000" cy="6858000" type="screen4x3"/>
   <p:notesSz cx="6858000" cy="9144000"/>
   <p:custDataLst>
-    <p:tags r:id="rId22"/>
+    <p:tags r:id="rId20"/>
   </p:custDataLst>
   <p:defaultTextStyle>
     <a:defPPr>
@@ -668,90 +666,6 @@
     <p:extLst>
       <p:ext uri="{BB962C8B-B14F-4D97-AF65-F5344CB8AC3E}">
         <p14:creationId xmlns:p14="http://schemas.microsoft.com/office/powerpoint/2010/main" val="946217838"/>
-      </p:ext>
-    </p:extLst>
-  </p:cSld>
-  <p:clrMapOvr>
-    <a:masterClrMapping/>
-  </p:clrMapOvr>
-</p:notes>
-</file>
-
-<file path=ppt/notesSlides/notesSlide3.xml><?xml version="1.0" encoding="utf-8"?>
-<p:notes xmlns:a="http://schemas.openxmlformats.org/drawingml/2006/main" xmlns:r="http://schemas.openxmlformats.org/officeDocument/2006/relationships" xmlns:p="http://schemas.openxmlformats.org/presentationml/2006/main">
-  <p:cSld>
-    <p:spTree>
-      <p:nvGrpSpPr>
-        <p:cNvPr id="1" name=""/>
-        <p:cNvGrpSpPr/>
-        <p:nvPr/>
-      </p:nvGrpSpPr>
-      <p:grpSpPr>
-        <a:xfrm>
-          <a:off x="0" y="0"/>
-          <a:ext cx="0" cy="0"/>
-          <a:chOff x="0" y="0"/>
-          <a:chExt cx="0" cy="0"/>
-        </a:xfrm>
-      </p:grpSpPr>
-      <p:sp>
-        <p:nvSpPr>
-          <p:cNvPr id="2" name="Marcador de imagen de diapositiva 1"/>
-          <p:cNvSpPr>
-            <a:spLocks noGrp="1" noRot="1" noChangeAspect="1"/>
-          </p:cNvSpPr>
-          <p:nvPr>
-            <p:ph type="sldImg"/>
-          </p:nvPr>
-        </p:nvSpPr>
-        <p:spPr/>
-      </p:sp>
-      <p:sp>
-        <p:nvSpPr>
-          <p:cNvPr id="3" name="Marcador de notas 2"/>
-          <p:cNvSpPr>
-            <a:spLocks noGrp="1"/>
-          </p:cNvSpPr>
-          <p:nvPr>
-            <p:ph type="body" idx="1"/>
-          </p:nvPr>
-        </p:nvSpPr>
-        <p:spPr/>
-        <p:txBody>
-          <a:bodyPr/>
-          <a:lstStyle/>
-          <a:p>
-            <a:endParaRPr lang="es-CL"/>
-          </a:p>
-        </p:txBody>
-      </p:sp>
-      <p:sp>
-        <p:nvSpPr>
-          <p:cNvPr id="4" name="Marcador de número de diapositiva 3"/>
-          <p:cNvSpPr>
-            <a:spLocks noGrp="1"/>
-          </p:cNvSpPr>
-          <p:nvPr>
-            <p:ph type="sldNum" sz="quarter" idx="10"/>
-          </p:nvPr>
-        </p:nvSpPr>
-        <p:spPr/>
-        <p:txBody>
-          <a:bodyPr/>
-          <a:lstStyle/>
-          <a:p>
-            <a:fld id="{31524595-A612-427C-89B0-BCF49485A725}" type="slidenum">
-              <a:rPr lang="es-CL" smtClean="0"/>
-              <a:t>15</a:t>
-            </a:fld>
-            <a:endParaRPr lang="es-CL"/>
-          </a:p>
-        </p:txBody>
-      </p:sp>
-    </p:spTree>
-    <p:extLst>
-      <p:ext uri="{BB962C8B-B14F-4D97-AF65-F5344CB8AC3E}">
-        <p14:creationId xmlns:p14="http://schemas.microsoft.com/office/powerpoint/2010/main" val="3866688620"/>
       </p:ext>
     </p:extLst>
   </p:cSld>
@@ -7436,151 +7350,6 @@
         </p:nvSpPr>
         <p:spPr>
           <a:xfrm>
-            <a:off x="457200" y="352371"/>
-            <a:ext cx="5056094" cy="758932"/>
-          </a:xfrm>
-        </p:spPr>
-        <p:txBody>
-          <a:bodyPr vert="horz" lIns="91440" tIns="45720" rIns="91440" bIns="45720" rtlCol="0" anchor="ctr">
-            <a:noAutofit/>
-          </a:bodyPr>
-          <a:lstStyle/>
-          <a:p>
-            <a:r>
-              <a:rPr lang="es-ES" sz="2400" b="1" dirty="0">
-                <a:solidFill>
-                  <a:srgbClr val="E30513"/>
-                </a:solidFill>
-                <a:latin typeface="+mn-lt"/>
-              </a:rPr>
-              <a:t>Definir Planes de Contingencia y Continuidad Operativa.</a:t>
-            </a:r>
-            <a:endParaRPr lang="es-CL" sz="2400" b="1" dirty="0">
-              <a:solidFill>
-                <a:srgbClr val="E30513"/>
-              </a:solidFill>
-              <a:latin typeface="+mn-lt"/>
-            </a:endParaRPr>
-          </a:p>
-        </p:txBody>
-      </p:sp>
-      <p:sp>
-        <p:nvSpPr>
-          <p:cNvPr id="5" name="Marcador de número de diapositiva 4"/>
-          <p:cNvSpPr>
-            <a:spLocks noGrp="1"/>
-          </p:cNvSpPr>
-          <p:nvPr>
-            <p:ph type="sldNum" sz="quarter" idx="12"/>
-          </p:nvPr>
-        </p:nvSpPr>
-        <p:spPr/>
-        <p:txBody>
-          <a:bodyPr/>
-          <a:lstStyle/>
-          <a:p>
-            <a:fld id="{C0F9E0D3-51B3-8D47-9FA0-6C6BA96BAD74}" type="slidenum">
-              <a:rPr lang="es-ES" smtClean="0"/>
-              <a:t>10</a:t>
-            </a:fld>
-            <a:endParaRPr lang="es-ES"/>
-          </a:p>
-        </p:txBody>
-      </p:sp>
-      <p:sp>
-        <p:nvSpPr>
-          <p:cNvPr id="6" name="Marcador de pie de página 5"/>
-          <p:cNvSpPr>
-            <a:spLocks noGrp="1"/>
-          </p:cNvSpPr>
-          <p:nvPr>
-            <p:ph type="ftr" sz="quarter" idx="11"/>
-          </p:nvPr>
-        </p:nvSpPr>
-        <p:spPr/>
-        <p:txBody>
-          <a:bodyPr/>
-          <a:lstStyle/>
-          <a:p>
-            <a:r>
-              <a:rPr lang="es-ES" dirty="0"/>
-              <a:t>Informática y Telecomunicaciones | Seguridad y Auditoría Informática</a:t>
-            </a:r>
-          </a:p>
-        </p:txBody>
-      </p:sp>
-      <p:pic>
-        <p:nvPicPr>
-          <p:cNvPr id="8" name="Imagen 7">
-            <a:extLst>
-              <a:ext uri="{FF2B5EF4-FFF2-40B4-BE49-F238E27FC236}">
-                <a16:creationId xmlns:a16="http://schemas.microsoft.com/office/drawing/2014/main" id="{BA2278E8-C3A6-40B3-A725-8EE6DDDA0097}"/>
-              </a:ext>
-            </a:extLst>
-          </p:cNvPr>
-          <p:cNvPicPr>
-            <a:picLocks noChangeAspect="1"/>
-          </p:cNvPicPr>
-          <p:nvPr/>
-        </p:nvPicPr>
-        <p:blipFill>
-          <a:blip r:embed="rId2"/>
-          <a:stretch>
-            <a:fillRect/>
-          </a:stretch>
-        </p:blipFill>
-        <p:spPr>
-          <a:xfrm>
-            <a:off x="1275659" y="1439068"/>
-            <a:ext cx="6592682" cy="3979863"/>
-          </a:xfrm>
-          <a:prstGeom prst="rect">
-            <a:avLst/>
-          </a:prstGeom>
-        </p:spPr>
-      </p:pic>
-    </p:spTree>
-    <p:extLst>
-      <p:ext uri="{BB962C8B-B14F-4D97-AF65-F5344CB8AC3E}">
-        <p14:creationId xmlns:p14="http://schemas.microsoft.com/office/powerpoint/2010/main" val="3956834863"/>
-      </p:ext>
-    </p:extLst>
-  </p:cSld>
-  <p:clrMapOvr>
-    <a:masterClrMapping/>
-  </p:clrMapOvr>
-</p:sld>
-</file>
-
-<file path=ppt/slides/slide11.xml><?xml version="1.0" encoding="utf-8"?>
-<p:sld xmlns:a="http://schemas.openxmlformats.org/drawingml/2006/main" xmlns:r="http://schemas.openxmlformats.org/officeDocument/2006/relationships" xmlns:p="http://schemas.openxmlformats.org/presentationml/2006/main">
-  <p:cSld>
-    <p:spTree>
-      <p:nvGrpSpPr>
-        <p:cNvPr id="1" name=""/>
-        <p:cNvGrpSpPr/>
-        <p:nvPr/>
-      </p:nvGrpSpPr>
-      <p:grpSpPr>
-        <a:xfrm>
-          <a:off x="0" y="0"/>
-          <a:ext cx="0" cy="0"/>
-          <a:chOff x="0" y="0"/>
-          <a:chExt cx="0" cy="0"/>
-        </a:xfrm>
-      </p:grpSpPr>
-      <p:sp>
-        <p:nvSpPr>
-          <p:cNvPr id="2" name="Título 1"/>
-          <p:cNvSpPr>
-            <a:spLocks noGrp="1"/>
-          </p:cNvSpPr>
-          <p:nvPr>
-            <p:ph type="title"/>
-          </p:nvPr>
-        </p:nvSpPr>
-        <p:spPr>
-          <a:xfrm>
             <a:off x="259354" y="385487"/>
             <a:ext cx="4849675" cy="733020"/>
           </a:xfrm>
@@ -7791,7 +7560,7 @@
           <a:p>
             <a:fld id="{C0F9E0D3-51B3-8D47-9FA0-6C6BA96BAD74}" type="slidenum">
               <a:rPr lang="es-ES" smtClean="0"/>
-              <a:t>11</a:t>
+              <a:t>10</a:t>
             </a:fld>
             <a:endParaRPr lang="es-ES"/>
           </a:p>
@@ -7886,6 +7655,208 @@
 </p:sld>
 </file>
 
+<file path=ppt/slides/slide11.xml><?xml version="1.0" encoding="utf-8"?>
+<p:sld xmlns:a="http://schemas.openxmlformats.org/drawingml/2006/main" xmlns:r="http://schemas.openxmlformats.org/officeDocument/2006/relationships" xmlns:p="http://schemas.openxmlformats.org/presentationml/2006/main">
+  <p:cSld>
+    <p:spTree>
+      <p:nvGrpSpPr>
+        <p:cNvPr id="1" name=""/>
+        <p:cNvGrpSpPr/>
+        <p:nvPr/>
+      </p:nvGrpSpPr>
+      <p:grpSpPr>
+        <a:xfrm>
+          <a:off x="0" y="0"/>
+          <a:ext cx="0" cy="0"/>
+          <a:chOff x="0" y="0"/>
+          <a:chExt cx="0" cy="0"/>
+        </a:xfrm>
+      </p:grpSpPr>
+      <p:sp>
+        <p:nvSpPr>
+          <p:cNvPr id="2" name="Título 1"/>
+          <p:cNvSpPr>
+            <a:spLocks noGrp="1"/>
+          </p:cNvSpPr>
+          <p:nvPr>
+            <p:ph type="title"/>
+          </p:nvPr>
+        </p:nvSpPr>
+        <p:spPr>
+          <a:xfrm>
+            <a:off x="259354" y="385487"/>
+            <a:ext cx="5023846" cy="733020"/>
+          </a:xfrm>
+        </p:spPr>
+        <p:txBody>
+          <a:bodyPr vert="horz" lIns="91440" tIns="45720" rIns="91440" bIns="45720" rtlCol="0" anchor="ctr">
+            <a:noAutofit/>
+          </a:bodyPr>
+          <a:lstStyle/>
+          <a:p>
+            <a:r>
+              <a:rPr lang="es-ES" sz="2400" b="1" dirty="0">
+                <a:solidFill>
+                  <a:srgbClr val="E30513"/>
+                </a:solidFill>
+                <a:latin typeface="+mn-lt"/>
+              </a:rPr>
+              <a:t>Planificación del Procedimiento de Actualización</a:t>
+            </a:r>
+            <a:endParaRPr lang="es-CL" sz="2400" b="1" dirty="0">
+              <a:solidFill>
+                <a:srgbClr val="E30513"/>
+              </a:solidFill>
+              <a:latin typeface="+mn-lt"/>
+            </a:endParaRPr>
+          </a:p>
+        </p:txBody>
+      </p:sp>
+      <p:sp>
+        <p:nvSpPr>
+          <p:cNvPr id="89" name="Título 1"/>
+          <p:cNvSpPr txBox="1">
+            <a:spLocks/>
+          </p:cNvSpPr>
+          <p:nvPr/>
+        </p:nvSpPr>
+        <p:spPr>
+          <a:xfrm>
+            <a:off x="391887" y="3773009"/>
+            <a:ext cx="8319406" cy="2366533"/>
+          </a:xfrm>
+          <a:prstGeom prst="rect">
+            <a:avLst/>
+          </a:prstGeom>
+        </p:spPr>
+        <p:txBody>
+          <a:bodyPr vert="horz" lIns="91440" tIns="45720" rIns="91440" bIns="45720" rtlCol="0" anchor="t">
+            <a:noAutofit/>
+          </a:bodyPr>
+          <a:lstStyle>
+            <a:lvl1pPr algn="l" defTabSz="457200" rtl="0" eaLnBrk="1" latinLnBrk="0" hangingPunct="1">
+              <a:spcBef>
+                <a:spcPct val="0"/>
+              </a:spcBef>
+              <a:buNone/>
+              <a:defRPr sz="3600" kern="1200">
+                <a:solidFill>
+                  <a:srgbClr val="FF0000"/>
+                </a:solidFill>
+                <a:latin typeface="Myriad Pro"/>
+                <a:ea typeface="+mj-ea"/>
+                <a:cs typeface="Myriad Pro"/>
+              </a:defRPr>
+            </a:lvl1pPr>
+          </a:lstStyle>
+          <a:p>
+            <a:pPr marL="285750" indent="-285750" algn="just">
+              <a:buFont typeface="Arial" panose="020B0604020202020204" pitchFamily="34" charset="0"/>
+              <a:buChar char="•"/>
+            </a:pPr>
+            <a:r>
+              <a:rPr lang="es-CL" sz="2400" dirty="0">
+                <a:solidFill>
+                  <a:schemeClr val="tx1">
+                    <a:lumMod val="75000"/>
+                    <a:lumOff val="25000"/>
+                  </a:schemeClr>
+                </a:solidFill>
+                <a:latin typeface="+mn-lt"/>
+              </a:rPr>
+              <a:t>Esta etapa contempla la planificación de cambios a nivel organizacional en materias de infraestructura y de organigrama, orientado a la formalización de procesos, reestructuración de roles y seguridad de la información, todo esto con miras en el cumplimiento de los objetivos.</a:t>
+            </a:r>
+          </a:p>
+        </p:txBody>
+      </p:sp>
+      <p:sp>
+        <p:nvSpPr>
+          <p:cNvPr id="3" name="Marcador de número de diapositiva 2"/>
+          <p:cNvSpPr>
+            <a:spLocks noGrp="1"/>
+          </p:cNvSpPr>
+          <p:nvPr>
+            <p:ph type="sldNum" sz="quarter" idx="12"/>
+          </p:nvPr>
+        </p:nvSpPr>
+        <p:spPr/>
+        <p:txBody>
+          <a:bodyPr/>
+          <a:lstStyle/>
+          <a:p>
+            <a:fld id="{C0F9E0D3-51B3-8D47-9FA0-6C6BA96BAD74}" type="slidenum">
+              <a:rPr lang="es-ES" smtClean="0"/>
+              <a:t>11</a:t>
+            </a:fld>
+            <a:endParaRPr lang="es-ES"/>
+          </a:p>
+        </p:txBody>
+      </p:sp>
+      <p:sp>
+        <p:nvSpPr>
+          <p:cNvPr id="4" name="Marcador de pie de página 3"/>
+          <p:cNvSpPr>
+            <a:spLocks noGrp="1"/>
+          </p:cNvSpPr>
+          <p:nvPr>
+            <p:ph type="ftr" sz="quarter" idx="11"/>
+          </p:nvPr>
+        </p:nvSpPr>
+        <p:spPr/>
+        <p:txBody>
+          <a:bodyPr/>
+          <a:lstStyle/>
+          <a:p>
+            <a:r>
+              <a:rPr lang="es-ES" dirty="0"/>
+              <a:t>Informática y Telecomunicaciones | Seguridad y Auditoría Informática</a:t>
+            </a:r>
+          </a:p>
+        </p:txBody>
+      </p:sp>
+      <p:pic>
+        <p:nvPicPr>
+          <p:cNvPr id="6" name="Imagen 5" descr="Imagen que contiene captura de pantalla&#10;&#10;Descripción generada automáticamente">
+            <a:extLst>
+              <a:ext uri="{FF2B5EF4-FFF2-40B4-BE49-F238E27FC236}">
+                <a16:creationId xmlns:a16="http://schemas.microsoft.com/office/drawing/2014/main" id="{2B5BBBB8-D620-4430-A66F-46ABE4A74C13}"/>
+              </a:ext>
+            </a:extLst>
+          </p:cNvPr>
+          <p:cNvPicPr>
+            <a:picLocks noChangeAspect="1"/>
+          </p:cNvPicPr>
+          <p:nvPr/>
+        </p:nvPicPr>
+        <p:blipFill>
+          <a:blip r:embed="rId2"/>
+          <a:stretch>
+            <a:fillRect/>
+          </a:stretch>
+        </p:blipFill>
+        <p:spPr>
+          <a:xfrm>
+            <a:off x="259354" y="1198406"/>
+            <a:ext cx="8625292" cy="2084533"/>
+          </a:xfrm>
+          <a:prstGeom prst="rect">
+            <a:avLst/>
+          </a:prstGeom>
+        </p:spPr>
+      </p:pic>
+    </p:spTree>
+    <p:extLst>
+      <p:ext uri="{BB962C8B-B14F-4D97-AF65-F5344CB8AC3E}">
+        <p14:creationId xmlns:p14="http://schemas.microsoft.com/office/powerpoint/2010/main" val="76513354"/>
+      </p:ext>
+    </p:extLst>
+  </p:cSld>
+  <p:clrMapOvr>
+    <a:masterClrMapping/>
+  </p:clrMapOvr>
+</p:sld>
+</file>
+
 <file path=ppt/slides/slide12.xml><?xml version="1.0" encoding="utf-8"?>
 <p:sld xmlns:a="http://schemas.openxmlformats.org/drawingml/2006/main" xmlns:r="http://schemas.openxmlformats.org/officeDocument/2006/relationships" xmlns:p="http://schemas.openxmlformats.org/presentationml/2006/main">
   <p:cSld>
@@ -7915,8 +7886,8 @@
         </p:nvSpPr>
         <p:spPr>
           <a:xfrm>
-            <a:off x="259354" y="385487"/>
-            <a:ext cx="5023846" cy="733020"/>
+            <a:off x="391887" y="242105"/>
+            <a:ext cx="5444760" cy="1079597"/>
           </a:xfrm>
         </p:spPr>
         <p:txBody>
@@ -7932,7 +7903,7 @@
                 </a:solidFill>
                 <a:latin typeface="+mn-lt"/>
               </a:rPr>
-              <a:t>Planificación del Procedimiento de Actualización</a:t>
+              <a:t>Procedimientos de publicación y divulgación de las Políticas a la Organización</a:t>
             </a:r>
             <a:endParaRPr lang="es-CL" sz="2400" b="1" dirty="0">
               <a:solidFill>
@@ -7953,8 +7924,8 @@
         </p:nvSpPr>
         <p:spPr>
           <a:xfrm>
-            <a:off x="391887" y="1118507"/>
-            <a:ext cx="8319406" cy="5021036"/>
+            <a:off x="391887" y="3835153"/>
+            <a:ext cx="8319406" cy="2507586"/>
           </a:xfrm>
           <a:prstGeom prst="rect">
             <a:avLst/>
@@ -7995,7 +7966,7 @@
                 </a:solidFill>
                 <a:latin typeface="+mn-lt"/>
               </a:rPr>
-              <a:t>Presentar ideas claves, ideas fuerza, sobre las temáticas propuestas. Cerrar la presentación. También puede incluir preguntas, imagen, animación, etc.</a:t>
+              <a:t>Corresponde a la forma que toma el gobierno corporativo de comunicar a los trabajadores y usuarios finales de los cambios en las políticas de la empresa, tratando de entregar un mensaje constructivo y que este quede grabado en la mente de las personas a las cuales iba dirigido.</a:t>
             </a:r>
           </a:p>
         </p:txBody>
@@ -8045,10 +8016,104 @@
           </a:p>
         </p:txBody>
       </p:sp>
+      <p:pic>
+        <p:nvPicPr>
+          <p:cNvPr id="1026" name="Picture 2" descr="http://elorbe.la/wp-content/uploads/2017/08/planes-concientizacion.png">
+            <a:extLst>
+              <a:ext uri="{FF2B5EF4-FFF2-40B4-BE49-F238E27FC236}">
+                <a16:creationId xmlns:a16="http://schemas.microsoft.com/office/drawing/2014/main" id="{9591379C-5B26-4864-802E-FA932CEF5808}"/>
+              </a:ext>
+            </a:extLst>
+          </p:cNvPr>
+          <p:cNvPicPr>
+            <a:picLocks noChangeAspect="1" noChangeArrowheads="1"/>
+          </p:cNvPicPr>
+          <p:nvPr/>
+        </p:nvPicPr>
+        <p:blipFill>
+          <a:blip r:embed="rId2">
+            <a:extLst>
+              <a:ext uri="{28A0092B-C50C-407E-A947-70E740481C1C}">
+                <a14:useLocalDpi xmlns:a14="http://schemas.microsoft.com/office/drawing/2010/main" val="0"/>
+              </a:ext>
+            </a:extLst>
+          </a:blip>
+          <a:srcRect/>
+          <a:stretch>
+            <a:fillRect/>
+          </a:stretch>
+        </p:blipFill>
+        <p:spPr bwMode="auto">
+          <a:xfrm>
+            <a:off x="1470991" y="1497715"/>
+            <a:ext cx="2021332" cy="2161424"/>
+          </a:xfrm>
+          <a:prstGeom prst="rect">
+            <a:avLst/>
+          </a:prstGeom>
+          <a:noFill/>
+          <a:extLst>
+            <a:ext uri="{909E8E84-426E-40DD-AFC4-6F175D3DCCD1}">
+              <a14:hiddenFill xmlns:a14="http://schemas.microsoft.com/office/drawing/2010/main">
+                <a:solidFill>
+                  <a:srgbClr val="FFFFFF"/>
+                </a:solidFill>
+              </a14:hiddenFill>
+            </a:ext>
+          </a:extLst>
+        </p:spPr>
+      </p:pic>
+      <p:pic>
+        <p:nvPicPr>
+          <p:cNvPr id="1028" name="Picture 4" descr="https://www.e-sign.cl/uploads/kcfinder/images/productos/concient.png">
+            <a:extLst>
+              <a:ext uri="{FF2B5EF4-FFF2-40B4-BE49-F238E27FC236}">
+                <a16:creationId xmlns:a16="http://schemas.microsoft.com/office/drawing/2014/main" id="{CAD03521-99FA-42FC-88BF-4F3632E33563}"/>
+              </a:ext>
+            </a:extLst>
+          </p:cNvPr>
+          <p:cNvPicPr>
+            <a:picLocks noChangeAspect="1" noChangeArrowheads="1"/>
+          </p:cNvPicPr>
+          <p:nvPr/>
+        </p:nvPicPr>
+        <p:blipFill>
+          <a:blip r:embed="rId3">
+            <a:extLst>
+              <a:ext uri="{28A0092B-C50C-407E-A947-70E740481C1C}">
+                <a14:useLocalDpi xmlns:a14="http://schemas.microsoft.com/office/drawing/2010/main" val="0"/>
+              </a:ext>
+            </a:extLst>
+          </a:blip>
+          <a:srcRect/>
+          <a:stretch>
+            <a:fillRect/>
+          </a:stretch>
+        </p:blipFill>
+        <p:spPr bwMode="auto">
+          <a:xfrm>
+            <a:off x="4216893" y="1197168"/>
+            <a:ext cx="3701988" cy="2471973"/>
+          </a:xfrm>
+          <a:prstGeom prst="rect">
+            <a:avLst/>
+          </a:prstGeom>
+          <a:noFill/>
+          <a:extLst>
+            <a:ext uri="{909E8E84-426E-40DD-AFC4-6F175D3DCCD1}">
+              <a14:hiddenFill xmlns:a14="http://schemas.microsoft.com/office/drawing/2010/main">
+                <a:solidFill>
+                  <a:srgbClr val="FFFFFF"/>
+                </a:solidFill>
+              </a14:hiddenFill>
+            </a:ext>
+          </a:extLst>
+        </p:spPr>
+      </p:pic>
     </p:spTree>
     <p:extLst>
       <p:ext uri="{BB962C8B-B14F-4D97-AF65-F5344CB8AC3E}">
-        <p14:creationId xmlns:p14="http://schemas.microsoft.com/office/powerpoint/2010/main" val="76513354"/>
+        <p14:creationId xmlns:p14="http://schemas.microsoft.com/office/powerpoint/2010/main" val="3557925842"/>
       </p:ext>
     </p:extLst>
   </p:cSld>
@@ -8087,178 +8152,6 @@
         </p:nvSpPr>
         <p:spPr>
           <a:xfrm>
-            <a:off x="391887" y="242105"/>
-            <a:ext cx="5444760" cy="1079597"/>
-          </a:xfrm>
-        </p:spPr>
-        <p:txBody>
-          <a:bodyPr vert="horz" lIns="91440" tIns="45720" rIns="91440" bIns="45720" rtlCol="0" anchor="ctr">
-            <a:noAutofit/>
-          </a:bodyPr>
-          <a:lstStyle/>
-          <a:p>
-            <a:r>
-              <a:rPr lang="es-ES" sz="2400" b="1" dirty="0">
-                <a:solidFill>
-                  <a:srgbClr val="E30513"/>
-                </a:solidFill>
-                <a:latin typeface="+mn-lt"/>
-              </a:rPr>
-              <a:t>Procedimientos de publicación y divulgación de las Políticas a la Organización</a:t>
-            </a:r>
-            <a:endParaRPr lang="es-CL" sz="2400" b="1" dirty="0">
-              <a:solidFill>
-                <a:srgbClr val="E30513"/>
-              </a:solidFill>
-              <a:latin typeface="+mn-lt"/>
-            </a:endParaRPr>
-          </a:p>
-        </p:txBody>
-      </p:sp>
-      <p:sp>
-        <p:nvSpPr>
-          <p:cNvPr id="89" name="Título 1"/>
-          <p:cNvSpPr txBox="1">
-            <a:spLocks/>
-          </p:cNvSpPr>
-          <p:nvPr/>
-        </p:nvSpPr>
-        <p:spPr>
-          <a:xfrm>
-            <a:off x="391887" y="1321703"/>
-            <a:ext cx="8319406" cy="5021036"/>
-          </a:xfrm>
-          <a:prstGeom prst="rect">
-            <a:avLst/>
-          </a:prstGeom>
-        </p:spPr>
-        <p:txBody>
-          <a:bodyPr vert="horz" lIns="91440" tIns="45720" rIns="91440" bIns="45720" rtlCol="0" anchor="t">
-            <a:noAutofit/>
-          </a:bodyPr>
-          <a:lstStyle>
-            <a:lvl1pPr algn="l" defTabSz="457200" rtl="0" eaLnBrk="1" latinLnBrk="0" hangingPunct="1">
-              <a:spcBef>
-                <a:spcPct val="0"/>
-              </a:spcBef>
-              <a:buNone/>
-              <a:defRPr sz="3600" kern="1200">
-                <a:solidFill>
-                  <a:srgbClr val="FF0000"/>
-                </a:solidFill>
-                <a:latin typeface="Myriad Pro"/>
-                <a:ea typeface="+mj-ea"/>
-                <a:cs typeface="Myriad Pro"/>
-              </a:defRPr>
-            </a:lvl1pPr>
-          </a:lstStyle>
-          <a:p>
-            <a:pPr marL="285750" indent="-285750" algn="just">
-              <a:buFont typeface="Arial" panose="020B0604020202020204" pitchFamily="34" charset="0"/>
-              <a:buChar char="•"/>
-            </a:pPr>
-            <a:r>
-              <a:rPr lang="es-CL" sz="2400" dirty="0">
-                <a:solidFill>
-                  <a:schemeClr val="tx1">
-                    <a:lumMod val="75000"/>
-                    <a:lumOff val="25000"/>
-                  </a:schemeClr>
-                </a:solidFill>
-                <a:latin typeface="+mn-lt"/>
-              </a:rPr>
-              <a:t>Presentar ideas claves, ideas fuerza, sobre las temáticas propuestas. Cerrar la presentación. También puede incluir preguntas, imagen, animación, etc.</a:t>
-            </a:r>
-          </a:p>
-        </p:txBody>
-      </p:sp>
-      <p:sp>
-        <p:nvSpPr>
-          <p:cNvPr id="3" name="Marcador de número de diapositiva 2"/>
-          <p:cNvSpPr>
-            <a:spLocks noGrp="1"/>
-          </p:cNvSpPr>
-          <p:nvPr>
-            <p:ph type="sldNum" sz="quarter" idx="12"/>
-          </p:nvPr>
-        </p:nvSpPr>
-        <p:spPr/>
-        <p:txBody>
-          <a:bodyPr/>
-          <a:lstStyle/>
-          <a:p>
-            <a:fld id="{C0F9E0D3-51B3-8D47-9FA0-6C6BA96BAD74}" type="slidenum">
-              <a:rPr lang="es-ES" smtClean="0"/>
-              <a:t>13</a:t>
-            </a:fld>
-            <a:endParaRPr lang="es-ES"/>
-          </a:p>
-        </p:txBody>
-      </p:sp>
-      <p:sp>
-        <p:nvSpPr>
-          <p:cNvPr id="4" name="Marcador de pie de página 3"/>
-          <p:cNvSpPr>
-            <a:spLocks noGrp="1"/>
-          </p:cNvSpPr>
-          <p:nvPr>
-            <p:ph type="ftr" sz="quarter" idx="11"/>
-          </p:nvPr>
-        </p:nvSpPr>
-        <p:spPr/>
-        <p:txBody>
-          <a:bodyPr/>
-          <a:lstStyle/>
-          <a:p>
-            <a:r>
-              <a:rPr lang="es-ES" dirty="0"/>
-              <a:t>Informática y Telecomunicaciones | Seguridad y Auditoría Informática</a:t>
-            </a:r>
-          </a:p>
-        </p:txBody>
-      </p:sp>
-    </p:spTree>
-    <p:extLst>
-      <p:ext uri="{BB962C8B-B14F-4D97-AF65-F5344CB8AC3E}">
-        <p14:creationId xmlns:p14="http://schemas.microsoft.com/office/powerpoint/2010/main" val="3557925842"/>
-      </p:ext>
-    </p:extLst>
-  </p:cSld>
-  <p:clrMapOvr>
-    <a:masterClrMapping/>
-  </p:clrMapOvr>
-</p:sld>
-</file>
-
-<file path=ppt/slides/slide14.xml><?xml version="1.0" encoding="utf-8"?>
-<p:sld xmlns:a="http://schemas.openxmlformats.org/drawingml/2006/main" xmlns:r="http://schemas.openxmlformats.org/officeDocument/2006/relationships" xmlns:p="http://schemas.openxmlformats.org/presentationml/2006/main">
-  <p:cSld>
-    <p:spTree>
-      <p:nvGrpSpPr>
-        <p:cNvPr id="1" name=""/>
-        <p:cNvGrpSpPr/>
-        <p:nvPr/>
-      </p:nvGrpSpPr>
-      <p:grpSpPr>
-        <a:xfrm>
-          <a:off x="0" y="0"/>
-          <a:ext cx="0" cy="0"/>
-          <a:chOff x="0" y="0"/>
-          <a:chExt cx="0" cy="0"/>
-        </a:xfrm>
-      </p:grpSpPr>
-      <p:sp>
-        <p:nvSpPr>
-          <p:cNvPr id="2" name="Título 1"/>
-          <p:cNvSpPr>
-            <a:spLocks noGrp="1"/>
-          </p:cNvSpPr>
-          <p:nvPr>
-            <p:ph type="title"/>
-          </p:nvPr>
-        </p:nvSpPr>
-        <p:spPr>
-          <a:xfrm>
             <a:off x="259354" y="385487"/>
             <a:ext cx="4035059" cy="436746"/>
           </a:xfrm>
@@ -8389,7 +8282,7 @@
           <a:p>
             <a:fld id="{C0F9E0D3-51B3-8D47-9FA0-6C6BA96BAD74}" type="slidenum">
               <a:rPr lang="es-ES" smtClean="0"/>
-              <a:t>14</a:t>
+              <a:t>13</a:t>
             </a:fld>
             <a:endParaRPr lang="es-ES"/>
           </a:p>
@@ -8421,324 +8314,6 @@
     <p:extLst>
       <p:ext uri="{BB962C8B-B14F-4D97-AF65-F5344CB8AC3E}">
         <p14:creationId xmlns:p14="http://schemas.microsoft.com/office/powerpoint/2010/main" val="4224773177"/>
-      </p:ext>
-    </p:extLst>
-  </p:cSld>
-  <p:clrMapOvr>
-    <a:masterClrMapping/>
-  </p:clrMapOvr>
-</p:sld>
-</file>
-
-<file path=ppt/slides/slide15.xml><?xml version="1.0" encoding="utf-8"?>
-<p:sld xmlns:a="http://schemas.openxmlformats.org/drawingml/2006/main" xmlns:r="http://schemas.openxmlformats.org/officeDocument/2006/relationships" xmlns:p="http://schemas.openxmlformats.org/presentationml/2006/main">
-  <p:cSld>
-    <p:spTree>
-      <p:nvGrpSpPr>
-        <p:cNvPr id="1" name=""/>
-        <p:cNvGrpSpPr/>
-        <p:nvPr/>
-      </p:nvGrpSpPr>
-      <p:grpSpPr>
-        <a:xfrm>
-          <a:off x="0" y="0"/>
-          <a:ext cx="0" cy="0"/>
-          <a:chOff x="0" y="0"/>
-          <a:chExt cx="0" cy="0"/>
-        </a:xfrm>
-      </p:grpSpPr>
-      <p:sp>
-        <p:nvSpPr>
-          <p:cNvPr id="2" name="Título 1"/>
-          <p:cNvSpPr>
-            <a:spLocks noGrp="1"/>
-          </p:cNvSpPr>
-          <p:nvPr>
-            <p:ph type="ctrTitle"/>
-          </p:nvPr>
-        </p:nvSpPr>
-        <p:spPr>
-          <a:xfrm>
-            <a:off x="1196788" y="1268567"/>
-            <a:ext cx="6575612" cy="1305603"/>
-          </a:xfrm>
-        </p:spPr>
-        <p:txBody>
-          <a:bodyPr/>
-          <a:lstStyle/>
-          <a:p>
-            <a:r>
-              <a:rPr lang="es-ES" sz="3200" b="1" dirty="0">
-                <a:latin typeface="+mn-lt"/>
-              </a:rPr>
-              <a:t>Herramientas, Planes y Políticas de Seguridad </a:t>
-            </a:r>
-          </a:p>
-        </p:txBody>
-      </p:sp>
-      <p:sp>
-        <p:nvSpPr>
-          <p:cNvPr id="3" name="Subtítulo 2"/>
-          <p:cNvSpPr>
-            <a:spLocks noGrp="1"/>
-          </p:cNvSpPr>
-          <p:nvPr>
-            <p:ph type="subTitle" idx="1"/>
-          </p:nvPr>
-        </p:nvSpPr>
-        <p:spPr>
-          <a:xfrm>
-            <a:off x="1371600" y="3478000"/>
-            <a:ext cx="6400800" cy="530679"/>
-          </a:xfrm>
-        </p:spPr>
-        <p:txBody>
-          <a:bodyPr>
-            <a:noAutofit/>
-          </a:bodyPr>
-          <a:lstStyle/>
-          <a:p>
-            <a:r>
-              <a:rPr lang="es-ES" sz="2000" b="1" dirty="0">
-                <a:latin typeface="+mn-lt"/>
-              </a:rPr>
-              <a:t>Unidad 2 : Blue </a:t>
-            </a:r>
-            <a:r>
-              <a:rPr lang="es-ES" sz="2000" b="1" dirty="0" err="1">
-                <a:latin typeface="+mn-lt"/>
-              </a:rPr>
-              <a:t>Team</a:t>
-            </a:r>
-            <a:r>
-              <a:rPr lang="es-ES" sz="2000" b="1" dirty="0">
-                <a:latin typeface="+mn-lt"/>
-              </a:rPr>
-              <a:t>: Herramientas, Planes Y Políticas De Seguridad</a:t>
-            </a:r>
-            <a:endParaRPr lang="es-CL" sz="2000" b="1" dirty="0">
-              <a:latin typeface="+mn-lt"/>
-            </a:endParaRPr>
-          </a:p>
-        </p:txBody>
-      </p:sp>
-      <p:sp>
-        <p:nvSpPr>
-          <p:cNvPr id="4" name="Subtítulo 2"/>
-          <p:cNvSpPr txBox="1">
-            <a:spLocks/>
-          </p:cNvSpPr>
-          <p:nvPr/>
-        </p:nvSpPr>
-        <p:spPr>
-          <a:xfrm>
-            <a:off x="1310258" y="4901650"/>
-            <a:ext cx="7137055" cy="1162036"/>
-          </a:xfrm>
-          <a:prstGeom prst="rect">
-            <a:avLst/>
-          </a:prstGeom>
-          <a:noFill/>
-        </p:spPr>
-        <p:txBody>
-          <a:bodyPr vert="horz" lIns="91440" tIns="45720" rIns="91440" bIns="45720" rtlCol="0">
-            <a:noAutofit/>
-          </a:bodyPr>
-          <a:lstStyle>
-            <a:lvl1pPr marL="0" indent="0" algn="ctr" defTabSz="457200" rtl="0" eaLnBrk="1" latinLnBrk="0" hangingPunct="1">
-              <a:spcBef>
-                <a:spcPct val="20000"/>
-              </a:spcBef>
-              <a:buFont typeface="Arial"/>
-              <a:buNone/>
-              <a:defRPr sz="2400" kern="1200">
-                <a:solidFill>
-                  <a:srgbClr val="FFFFFF"/>
-                </a:solidFill>
-                <a:latin typeface="Myriad Pro"/>
-                <a:ea typeface="+mn-ea"/>
-                <a:cs typeface="Myriad Pro"/>
-              </a:defRPr>
-            </a:lvl1pPr>
-            <a:lvl2pPr marL="457200" indent="0" algn="ctr" defTabSz="457200" rtl="0" eaLnBrk="1" latinLnBrk="0" hangingPunct="1">
-              <a:spcBef>
-                <a:spcPct val="20000"/>
-              </a:spcBef>
-              <a:buFont typeface="Arial"/>
-              <a:buNone/>
-              <a:defRPr sz="2000" kern="1200">
-                <a:solidFill>
-                  <a:schemeClr val="tx1">
-                    <a:tint val="75000"/>
-                  </a:schemeClr>
-                </a:solidFill>
-                <a:latin typeface="Myriad Pro"/>
-                <a:ea typeface="+mn-ea"/>
-                <a:cs typeface="Myriad Pro"/>
-              </a:defRPr>
-            </a:lvl2pPr>
-            <a:lvl3pPr marL="914400" indent="0" algn="ctr" defTabSz="457200" rtl="0" eaLnBrk="1" latinLnBrk="0" hangingPunct="1">
-              <a:spcBef>
-                <a:spcPct val="20000"/>
-              </a:spcBef>
-              <a:buFont typeface="Arial"/>
-              <a:buNone/>
-              <a:defRPr sz="1800" kern="1200">
-                <a:solidFill>
-                  <a:schemeClr val="tx1">
-                    <a:tint val="75000"/>
-                  </a:schemeClr>
-                </a:solidFill>
-                <a:latin typeface="Myriad Pro"/>
-                <a:ea typeface="+mn-ea"/>
-                <a:cs typeface="Myriad Pro"/>
-              </a:defRPr>
-            </a:lvl3pPr>
-            <a:lvl4pPr marL="1371600" indent="0" algn="ctr" defTabSz="457200" rtl="0" eaLnBrk="1" latinLnBrk="0" hangingPunct="1">
-              <a:spcBef>
-                <a:spcPct val="20000"/>
-              </a:spcBef>
-              <a:buFont typeface="Arial"/>
-              <a:buNone/>
-              <a:defRPr sz="1600" kern="1200">
-                <a:solidFill>
-                  <a:schemeClr val="tx1">
-                    <a:tint val="75000"/>
-                  </a:schemeClr>
-                </a:solidFill>
-                <a:latin typeface="Myriad Pro"/>
-                <a:ea typeface="+mn-ea"/>
-                <a:cs typeface="Myriad Pro"/>
-              </a:defRPr>
-            </a:lvl4pPr>
-            <a:lvl5pPr marL="1828800" indent="0" algn="ctr" defTabSz="457200" rtl="0" eaLnBrk="1" latinLnBrk="0" hangingPunct="1">
-              <a:spcBef>
-                <a:spcPct val="20000"/>
-              </a:spcBef>
-              <a:buFont typeface="Arial"/>
-              <a:buNone/>
-              <a:defRPr sz="1600" kern="1200">
-                <a:solidFill>
-                  <a:schemeClr val="tx1">
-                    <a:tint val="75000"/>
-                  </a:schemeClr>
-                </a:solidFill>
-                <a:latin typeface="Myriad Pro"/>
-                <a:ea typeface="+mn-ea"/>
-                <a:cs typeface="Myriad Pro"/>
-              </a:defRPr>
-            </a:lvl5pPr>
-            <a:lvl6pPr marL="2286000" indent="0" algn="ctr" defTabSz="457200" rtl="0" eaLnBrk="1" latinLnBrk="0" hangingPunct="1">
-              <a:spcBef>
-                <a:spcPct val="20000"/>
-              </a:spcBef>
-              <a:buFont typeface="Arial"/>
-              <a:buNone/>
-              <a:defRPr sz="2000" kern="1200">
-                <a:solidFill>
-                  <a:schemeClr val="tx1">
-                    <a:tint val="75000"/>
-                  </a:schemeClr>
-                </a:solidFill>
-                <a:latin typeface="+mn-lt"/>
-                <a:ea typeface="+mn-ea"/>
-                <a:cs typeface="+mn-cs"/>
-              </a:defRPr>
-            </a:lvl6pPr>
-            <a:lvl7pPr marL="2743200" indent="0" algn="ctr" defTabSz="457200" rtl="0" eaLnBrk="1" latinLnBrk="0" hangingPunct="1">
-              <a:spcBef>
-                <a:spcPct val="20000"/>
-              </a:spcBef>
-              <a:buFont typeface="Arial"/>
-              <a:buNone/>
-              <a:defRPr sz="2000" kern="1200">
-                <a:solidFill>
-                  <a:schemeClr val="tx1">
-                    <a:tint val="75000"/>
-                  </a:schemeClr>
-                </a:solidFill>
-                <a:latin typeface="+mn-lt"/>
-                <a:ea typeface="+mn-ea"/>
-                <a:cs typeface="+mn-cs"/>
-              </a:defRPr>
-            </a:lvl7pPr>
-            <a:lvl8pPr marL="3200400" indent="0" algn="ctr" defTabSz="457200" rtl="0" eaLnBrk="1" latinLnBrk="0" hangingPunct="1">
-              <a:spcBef>
-                <a:spcPct val="20000"/>
-              </a:spcBef>
-              <a:buFont typeface="Arial"/>
-              <a:buNone/>
-              <a:defRPr sz="2000" kern="1200">
-                <a:solidFill>
-                  <a:schemeClr val="tx1">
-                    <a:tint val="75000"/>
-                  </a:schemeClr>
-                </a:solidFill>
-                <a:latin typeface="+mn-lt"/>
-                <a:ea typeface="+mn-ea"/>
-                <a:cs typeface="+mn-cs"/>
-              </a:defRPr>
-            </a:lvl8pPr>
-            <a:lvl9pPr marL="3657600" indent="0" algn="ctr" defTabSz="457200" rtl="0" eaLnBrk="1" latinLnBrk="0" hangingPunct="1">
-              <a:spcBef>
-                <a:spcPct val="20000"/>
-              </a:spcBef>
-              <a:buFont typeface="Arial"/>
-              <a:buNone/>
-              <a:defRPr sz="2000" kern="1200">
-                <a:solidFill>
-                  <a:schemeClr val="tx1">
-                    <a:tint val="75000"/>
-                  </a:schemeClr>
-                </a:solidFill>
-                <a:latin typeface="+mn-lt"/>
-                <a:ea typeface="+mn-ea"/>
-                <a:cs typeface="+mn-cs"/>
-              </a:defRPr>
-            </a:lvl9pPr>
-          </a:lstStyle>
-          <a:p>
-            <a:pPr algn="l"/>
-            <a:r>
-              <a:rPr lang="es-CL" sz="1600" dirty="0">
-                <a:latin typeface="+mn-lt"/>
-              </a:rPr>
-              <a:t>Nombre de asignatura: Seguridad y Auditoría Informática.</a:t>
-            </a:r>
-          </a:p>
-          <a:p>
-            <a:pPr algn="l"/>
-            <a:r>
-              <a:rPr lang="es-CL" sz="1600" dirty="0">
-                <a:latin typeface="+mn-lt"/>
-              </a:rPr>
-              <a:t>Nombre integrantes del grupo: Ivo Olivares, Felipe Inda, Aron Fuentes.</a:t>
-            </a:r>
-          </a:p>
-          <a:p>
-            <a:pPr algn="l"/>
-            <a:r>
-              <a:rPr lang="es-CL" sz="1600" dirty="0">
-                <a:latin typeface="+mn-lt"/>
-              </a:rPr>
-              <a:t>Nombre carrera: Ingeniería en informática.</a:t>
-            </a:r>
-          </a:p>
-          <a:p>
-            <a:pPr algn="l"/>
-            <a:r>
-              <a:rPr lang="es-CL" sz="1600" dirty="0">
-                <a:latin typeface="+mn-lt"/>
-              </a:rPr>
-              <a:t>Fecha exposición: 13 de mayo del 2019</a:t>
-            </a:r>
-          </a:p>
-        </p:txBody>
-      </p:sp>
-    </p:spTree>
-    <p:extLst>
-      <p:ext uri="{BB962C8B-B14F-4D97-AF65-F5344CB8AC3E}">
-        <p14:creationId xmlns:p14="http://schemas.microsoft.com/office/powerpoint/2010/main" val="1757988907"/>
       </p:ext>
     </p:extLst>
   </p:cSld>
@@ -9113,74 +8688,6 @@
       </p:grpSpPr>
       <p:sp>
         <p:nvSpPr>
-          <p:cNvPr id="2" name="Marcador de contenido 1"/>
-          <p:cNvSpPr>
-            <a:spLocks noGrp="1"/>
-          </p:cNvSpPr>
-          <p:nvPr>
-            <p:ph sz="half" idx="2"/>
-          </p:nvPr>
-        </p:nvSpPr>
-        <p:spPr/>
-        <p:txBody>
-          <a:bodyPr/>
-          <a:lstStyle/>
-          <a:p>
-            <a:endParaRPr lang="es-CL"/>
-          </a:p>
-        </p:txBody>
-      </p:sp>
-      <p:sp>
-        <p:nvSpPr>
-          <p:cNvPr id="3" name="Título 2"/>
-          <p:cNvSpPr>
-            <a:spLocks noGrp="1"/>
-          </p:cNvSpPr>
-          <p:nvPr>
-            <p:ph type="title"/>
-          </p:nvPr>
-        </p:nvSpPr>
-        <p:spPr/>
-        <p:txBody>
-          <a:bodyPr/>
-          <a:lstStyle/>
-          <a:p>
-            <a:endParaRPr lang="es-CL" b="1" cap="none" dirty="0"/>
-          </a:p>
-        </p:txBody>
-      </p:sp>
-    </p:spTree>
-    <p:extLst>
-      <p:ext uri="{BB962C8B-B14F-4D97-AF65-F5344CB8AC3E}">
-        <p14:creationId xmlns:p14="http://schemas.microsoft.com/office/powerpoint/2010/main" val="500729557"/>
-      </p:ext>
-    </p:extLst>
-  </p:cSld>
-  <p:clrMapOvr>
-    <a:masterClrMapping/>
-  </p:clrMapOvr>
-</p:sld>
-</file>
-
-<file path=ppt/slides/slide4.xml><?xml version="1.0" encoding="utf-8"?>
-<p:sld xmlns:a="http://schemas.openxmlformats.org/drawingml/2006/main" xmlns:r="http://schemas.openxmlformats.org/officeDocument/2006/relationships" xmlns:p="http://schemas.openxmlformats.org/presentationml/2006/main">
-  <p:cSld>
-    <p:spTree>
-      <p:nvGrpSpPr>
-        <p:cNvPr id="1" name=""/>
-        <p:cNvGrpSpPr/>
-        <p:nvPr/>
-      </p:nvGrpSpPr>
-      <p:grpSpPr>
-        <a:xfrm>
-          <a:off x="0" y="0"/>
-          <a:ext cx="0" cy="0"/>
-          <a:chOff x="0" y="0"/>
-          <a:chExt cx="0" cy="0"/>
-        </a:xfrm>
-      </p:grpSpPr>
-      <p:sp>
-        <p:nvSpPr>
           <p:cNvPr id="2" name="Título 1"/>
           <p:cNvSpPr>
             <a:spLocks noGrp="1"/>
@@ -9341,7 +8848,7 @@
           <a:p>
             <a:fld id="{C0F9E0D3-51B3-8D47-9FA0-6C6BA96BAD74}" type="slidenum">
               <a:rPr lang="es-ES" smtClean="0"/>
-              <a:t>4</a:t>
+              <a:t>3</a:t>
             </a:fld>
             <a:endParaRPr lang="es-ES"/>
           </a:p>
@@ -9436,6 +8943,121 @@
 </p:sld>
 </file>
 
+<file path=ppt/slides/slide4.xml><?xml version="1.0" encoding="utf-8"?>
+<p:sld xmlns:a="http://schemas.openxmlformats.org/drawingml/2006/main" xmlns:r="http://schemas.openxmlformats.org/officeDocument/2006/relationships" xmlns:p="http://schemas.openxmlformats.org/presentationml/2006/main">
+  <p:cSld>
+    <p:spTree>
+      <p:nvGrpSpPr>
+        <p:cNvPr id="1" name=""/>
+        <p:cNvGrpSpPr/>
+        <p:nvPr/>
+      </p:nvGrpSpPr>
+      <p:grpSpPr>
+        <a:xfrm>
+          <a:off x="0" y="0"/>
+          <a:ext cx="0" cy="0"/>
+          <a:chOff x="0" y="0"/>
+          <a:chExt cx="0" cy="0"/>
+        </a:xfrm>
+      </p:grpSpPr>
+      <p:sp>
+        <p:nvSpPr>
+          <p:cNvPr id="2" name="Título 1"/>
+          <p:cNvSpPr>
+            <a:spLocks noGrp="1"/>
+          </p:cNvSpPr>
+          <p:nvPr>
+            <p:ph type="title"/>
+          </p:nvPr>
+        </p:nvSpPr>
+        <p:spPr>
+          <a:xfrm>
+            <a:off x="259354" y="385487"/>
+            <a:ext cx="5139960" cy="733020"/>
+          </a:xfrm>
+        </p:spPr>
+        <p:txBody>
+          <a:bodyPr vert="horz" lIns="91440" tIns="45720" rIns="91440" bIns="45720" rtlCol="0" anchor="ctr">
+            <a:noAutofit/>
+          </a:bodyPr>
+          <a:lstStyle/>
+          <a:p>
+            <a:r>
+              <a:rPr lang="es-ES" sz="2400" b="1" dirty="0">
+                <a:solidFill>
+                  <a:srgbClr val="E30513"/>
+                </a:solidFill>
+                <a:latin typeface="+mn-lt"/>
+              </a:rPr>
+              <a:t>Definir perfiles, responsables y sanciones.</a:t>
+            </a:r>
+            <a:endParaRPr lang="es-CL" sz="2400" b="1" dirty="0">
+              <a:solidFill>
+                <a:srgbClr val="E30513"/>
+              </a:solidFill>
+              <a:latin typeface="+mn-lt"/>
+            </a:endParaRPr>
+          </a:p>
+        </p:txBody>
+      </p:sp>
+      <p:sp>
+        <p:nvSpPr>
+          <p:cNvPr id="3" name="Marcador de número de diapositiva 2"/>
+          <p:cNvSpPr>
+            <a:spLocks noGrp="1"/>
+          </p:cNvSpPr>
+          <p:nvPr>
+            <p:ph type="sldNum" sz="quarter" idx="12"/>
+          </p:nvPr>
+        </p:nvSpPr>
+        <p:spPr/>
+        <p:txBody>
+          <a:bodyPr/>
+          <a:lstStyle/>
+          <a:p>
+            <a:fld id="{C0F9E0D3-51B3-8D47-9FA0-6C6BA96BAD74}" type="slidenum">
+              <a:rPr lang="es-ES" smtClean="0"/>
+              <a:t>4</a:t>
+            </a:fld>
+            <a:endParaRPr lang="es-ES"/>
+          </a:p>
+        </p:txBody>
+      </p:sp>
+      <p:sp>
+        <p:nvSpPr>
+          <p:cNvPr id="4" name="Marcador de pie de página 3"/>
+          <p:cNvSpPr>
+            <a:spLocks noGrp="1"/>
+          </p:cNvSpPr>
+          <p:nvPr>
+            <p:ph type="ftr" sz="quarter" idx="11"/>
+          </p:nvPr>
+        </p:nvSpPr>
+        <p:spPr/>
+        <p:txBody>
+          <a:bodyPr/>
+          <a:lstStyle/>
+          <a:p>
+            <a:r>
+              <a:rPr lang="es-ES" dirty="0"/>
+              <a:t>Informática y Telecomunicaciones | Seguridad y Auditoría Informática</a:t>
+            </a:r>
+          </a:p>
+        </p:txBody>
+      </p:sp>
+    </p:spTree>
+    <p:extLst>
+      <p:ext uri="{BB962C8B-B14F-4D97-AF65-F5344CB8AC3E}">
+        <p14:creationId xmlns:p14="http://schemas.microsoft.com/office/powerpoint/2010/main" val="1676933570"/>
+      </p:ext>
+    </p:extLst>
+  </p:cSld>
+  <p:clrMapOvr>
+    <a:masterClrMapping/>
+  </p:clrMapOvr>
+</p:sld>
+</file>
+
 <file path=ppt/slides/slide5.xml><?xml version="1.0" encoding="utf-8"?>
 <p:sld xmlns:a="http://schemas.openxmlformats.org/drawingml/2006/main" xmlns:r="http://schemas.openxmlformats.org/officeDocument/2006/relationships" xmlns:p="http://schemas.openxmlformats.org/presentationml/2006/main">
   <p:cSld>
@@ -9465,121 +9087,6 @@
         </p:nvSpPr>
         <p:spPr>
           <a:xfrm>
-            <a:off x="259354" y="385487"/>
-            <a:ext cx="5139960" cy="733020"/>
-          </a:xfrm>
-        </p:spPr>
-        <p:txBody>
-          <a:bodyPr vert="horz" lIns="91440" tIns="45720" rIns="91440" bIns="45720" rtlCol="0" anchor="ctr">
-            <a:noAutofit/>
-          </a:bodyPr>
-          <a:lstStyle/>
-          <a:p>
-            <a:r>
-              <a:rPr lang="es-ES" sz="2400" b="1" dirty="0">
-                <a:solidFill>
-                  <a:srgbClr val="E30513"/>
-                </a:solidFill>
-                <a:latin typeface="+mn-lt"/>
-              </a:rPr>
-              <a:t>Definir perfiles, responsables y sanciones.</a:t>
-            </a:r>
-            <a:endParaRPr lang="es-CL" sz="2400" b="1" dirty="0">
-              <a:solidFill>
-                <a:srgbClr val="E30513"/>
-              </a:solidFill>
-              <a:latin typeface="+mn-lt"/>
-            </a:endParaRPr>
-          </a:p>
-        </p:txBody>
-      </p:sp>
-      <p:sp>
-        <p:nvSpPr>
-          <p:cNvPr id="3" name="Marcador de número de diapositiva 2"/>
-          <p:cNvSpPr>
-            <a:spLocks noGrp="1"/>
-          </p:cNvSpPr>
-          <p:nvPr>
-            <p:ph type="sldNum" sz="quarter" idx="12"/>
-          </p:nvPr>
-        </p:nvSpPr>
-        <p:spPr/>
-        <p:txBody>
-          <a:bodyPr/>
-          <a:lstStyle/>
-          <a:p>
-            <a:fld id="{C0F9E0D3-51B3-8D47-9FA0-6C6BA96BAD74}" type="slidenum">
-              <a:rPr lang="es-ES" smtClean="0"/>
-              <a:t>5</a:t>
-            </a:fld>
-            <a:endParaRPr lang="es-ES"/>
-          </a:p>
-        </p:txBody>
-      </p:sp>
-      <p:sp>
-        <p:nvSpPr>
-          <p:cNvPr id="4" name="Marcador de pie de página 3"/>
-          <p:cNvSpPr>
-            <a:spLocks noGrp="1"/>
-          </p:cNvSpPr>
-          <p:nvPr>
-            <p:ph type="ftr" sz="quarter" idx="11"/>
-          </p:nvPr>
-        </p:nvSpPr>
-        <p:spPr/>
-        <p:txBody>
-          <a:bodyPr/>
-          <a:lstStyle/>
-          <a:p>
-            <a:r>
-              <a:rPr lang="es-ES" dirty="0"/>
-              <a:t>Informática y Telecomunicaciones | Seguridad y Auditoría Informática</a:t>
-            </a:r>
-          </a:p>
-        </p:txBody>
-      </p:sp>
-    </p:spTree>
-    <p:extLst>
-      <p:ext uri="{BB962C8B-B14F-4D97-AF65-F5344CB8AC3E}">
-        <p14:creationId xmlns:p14="http://schemas.microsoft.com/office/powerpoint/2010/main" val="1676933570"/>
-      </p:ext>
-    </p:extLst>
-  </p:cSld>
-  <p:clrMapOvr>
-    <a:masterClrMapping/>
-  </p:clrMapOvr>
-</p:sld>
-</file>
-
-<file path=ppt/slides/slide6.xml><?xml version="1.0" encoding="utf-8"?>
-<p:sld xmlns:a="http://schemas.openxmlformats.org/drawingml/2006/main" xmlns:r="http://schemas.openxmlformats.org/officeDocument/2006/relationships" xmlns:p="http://schemas.openxmlformats.org/presentationml/2006/main">
-  <p:cSld>
-    <p:spTree>
-      <p:nvGrpSpPr>
-        <p:cNvPr id="1" name=""/>
-        <p:cNvGrpSpPr/>
-        <p:nvPr/>
-      </p:nvGrpSpPr>
-      <p:grpSpPr>
-        <a:xfrm>
-          <a:off x="0" y="0"/>
-          <a:ext cx="0" cy="0"/>
-          <a:chOff x="0" y="0"/>
-          <a:chExt cx="0" cy="0"/>
-        </a:xfrm>
-      </p:grpSpPr>
-      <p:sp>
-        <p:nvSpPr>
-          <p:cNvPr id="2" name="Título 1"/>
-          <p:cNvSpPr>
-            <a:spLocks noGrp="1"/>
-          </p:cNvSpPr>
-          <p:nvPr>
-            <p:ph type="title"/>
-          </p:nvPr>
-        </p:nvSpPr>
-        <p:spPr>
-          <a:xfrm>
             <a:off x="457200" y="352371"/>
             <a:ext cx="5056094" cy="758932"/>
           </a:xfrm>
@@ -9625,7 +9132,7 @@
           <a:p>
             <a:fld id="{C0F9E0D3-51B3-8D47-9FA0-6C6BA96BAD74}" type="slidenum">
               <a:rPr lang="es-ES" smtClean="0"/>
-              <a:t>6</a:t>
+              <a:t>5</a:t>
             </a:fld>
             <a:endParaRPr lang="es-ES"/>
           </a:p>
@@ -9696,7 +9203,7 @@
 </p:sld>
 </file>
 
-<file path=ppt/slides/slide7.xml><?xml version="1.0" encoding="utf-8"?>
+<file path=ppt/slides/slide6.xml><?xml version="1.0" encoding="utf-8"?>
 <p:sld xmlns:a="http://schemas.openxmlformats.org/drawingml/2006/main" xmlns:r="http://schemas.openxmlformats.org/officeDocument/2006/relationships" xmlns:p="http://schemas.openxmlformats.org/presentationml/2006/main">
   <p:cSld>
     <p:spTree>
@@ -9770,7 +9277,7 @@
           <a:p>
             <a:fld id="{C0F9E0D3-51B3-8D47-9FA0-6C6BA96BAD74}" type="slidenum">
               <a:rPr lang="es-ES" smtClean="0"/>
-              <a:t>7</a:t>
+              <a:t>6</a:t>
             </a:fld>
             <a:endParaRPr lang="es-ES"/>
           </a:p>
@@ -9841,7 +9348,7 @@
 </p:sld>
 </file>
 
-<file path=ppt/slides/slide8.xml><?xml version="1.0" encoding="utf-8"?>
+<file path=ppt/slides/slide7.xml><?xml version="1.0" encoding="utf-8"?>
 <p:sld xmlns:a="http://schemas.openxmlformats.org/drawingml/2006/main" xmlns:r="http://schemas.openxmlformats.org/officeDocument/2006/relationships" xmlns:p="http://schemas.openxmlformats.org/presentationml/2006/main">
   <p:cSld>
     <p:spTree>
@@ -9915,7 +9422,7 @@
           <a:p>
             <a:fld id="{C0F9E0D3-51B3-8D47-9FA0-6C6BA96BAD74}" type="slidenum">
               <a:rPr lang="es-ES" smtClean="0"/>
-              <a:t>8</a:t>
+              <a:t>7</a:t>
             </a:fld>
             <a:endParaRPr lang="es-ES"/>
           </a:p>
@@ -9986,7 +9493,7 @@
 </p:sld>
 </file>
 
-<file path=ppt/slides/slide9.xml><?xml version="1.0" encoding="utf-8"?>
+<file path=ppt/slides/slide8.xml><?xml version="1.0" encoding="utf-8"?>
 <p:sld xmlns:a="http://schemas.openxmlformats.org/drawingml/2006/main" xmlns:r="http://schemas.openxmlformats.org/officeDocument/2006/relationships" xmlns:p="http://schemas.openxmlformats.org/presentationml/2006/main">
   <p:cSld>
     <p:spTree>
@@ -10060,7 +9567,7 @@
           <a:p>
             <a:fld id="{C0F9E0D3-51B3-8D47-9FA0-6C6BA96BAD74}" type="slidenum">
               <a:rPr lang="es-ES" smtClean="0"/>
-              <a:t>9</a:t>
+              <a:t>8</a:t>
             </a:fld>
             <a:endParaRPr lang="es-ES"/>
           </a:p>
@@ -10122,6 +9629,151 @@
     <p:extLst>
       <p:ext uri="{BB962C8B-B14F-4D97-AF65-F5344CB8AC3E}">
         <p14:creationId xmlns:p14="http://schemas.microsoft.com/office/powerpoint/2010/main" val="526804195"/>
+      </p:ext>
+    </p:extLst>
+  </p:cSld>
+  <p:clrMapOvr>
+    <a:masterClrMapping/>
+  </p:clrMapOvr>
+</p:sld>
+</file>
+
+<file path=ppt/slides/slide9.xml><?xml version="1.0" encoding="utf-8"?>
+<p:sld xmlns:a="http://schemas.openxmlformats.org/drawingml/2006/main" xmlns:r="http://schemas.openxmlformats.org/officeDocument/2006/relationships" xmlns:p="http://schemas.openxmlformats.org/presentationml/2006/main">
+  <p:cSld>
+    <p:spTree>
+      <p:nvGrpSpPr>
+        <p:cNvPr id="1" name=""/>
+        <p:cNvGrpSpPr/>
+        <p:nvPr/>
+      </p:nvGrpSpPr>
+      <p:grpSpPr>
+        <a:xfrm>
+          <a:off x="0" y="0"/>
+          <a:ext cx="0" cy="0"/>
+          <a:chOff x="0" y="0"/>
+          <a:chExt cx="0" cy="0"/>
+        </a:xfrm>
+      </p:grpSpPr>
+      <p:sp>
+        <p:nvSpPr>
+          <p:cNvPr id="2" name="Título 1"/>
+          <p:cNvSpPr>
+            <a:spLocks noGrp="1"/>
+          </p:cNvSpPr>
+          <p:nvPr>
+            <p:ph type="title"/>
+          </p:nvPr>
+        </p:nvSpPr>
+        <p:spPr>
+          <a:xfrm>
+            <a:off x="457200" y="352371"/>
+            <a:ext cx="5056094" cy="758932"/>
+          </a:xfrm>
+        </p:spPr>
+        <p:txBody>
+          <a:bodyPr vert="horz" lIns="91440" tIns="45720" rIns="91440" bIns="45720" rtlCol="0" anchor="ctr">
+            <a:noAutofit/>
+          </a:bodyPr>
+          <a:lstStyle/>
+          <a:p>
+            <a:r>
+              <a:rPr lang="es-ES" sz="2400" b="1" dirty="0">
+                <a:solidFill>
+                  <a:srgbClr val="E30513"/>
+                </a:solidFill>
+                <a:latin typeface="+mn-lt"/>
+              </a:rPr>
+              <a:t>Definir Planes de Contingencia y Continuidad Operativa.</a:t>
+            </a:r>
+            <a:endParaRPr lang="es-CL" sz="2400" b="1" dirty="0">
+              <a:solidFill>
+                <a:srgbClr val="E30513"/>
+              </a:solidFill>
+              <a:latin typeface="+mn-lt"/>
+            </a:endParaRPr>
+          </a:p>
+        </p:txBody>
+      </p:sp>
+      <p:sp>
+        <p:nvSpPr>
+          <p:cNvPr id="5" name="Marcador de número de diapositiva 4"/>
+          <p:cNvSpPr>
+            <a:spLocks noGrp="1"/>
+          </p:cNvSpPr>
+          <p:nvPr>
+            <p:ph type="sldNum" sz="quarter" idx="12"/>
+          </p:nvPr>
+        </p:nvSpPr>
+        <p:spPr/>
+        <p:txBody>
+          <a:bodyPr/>
+          <a:lstStyle/>
+          <a:p>
+            <a:fld id="{C0F9E0D3-51B3-8D47-9FA0-6C6BA96BAD74}" type="slidenum">
+              <a:rPr lang="es-ES" smtClean="0"/>
+              <a:t>9</a:t>
+            </a:fld>
+            <a:endParaRPr lang="es-ES"/>
+          </a:p>
+        </p:txBody>
+      </p:sp>
+      <p:sp>
+        <p:nvSpPr>
+          <p:cNvPr id="6" name="Marcador de pie de página 5"/>
+          <p:cNvSpPr>
+            <a:spLocks noGrp="1"/>
+          </p:cNvSpPr>
+          <p:nvPr>
+            <p:ph type="ftr" sz="quarter" idx="11"/>
+          </p:nvPr>
+        </p:nvSpPr>
+        <p:spPr/>
+        <p:txBody>
+          <a:bodyPr/>
+          <a:lstStyle/>
+          <a:p>
+            <a:r>
+              <a:rPr lang="es-ES" dirty="0"/>
+              <a:t>Informática y Telecomunicaciones | Seguridad y Auditoría Informática</a:t>
+            </a:r>
+          </a:p>
+        </p:txBody>
+      </p:sp>
+      <p:pic>
+        <p:nvPicPr>
+          <p:cNvPr id="8" name="Imagen 7">
+            <a:extLst>
+              <a:ext uri="{FF2B5EF4-FFF2-40B4-BE49-F238E27FC236}">
+                <a16:creationId xmlns:a16="http://schemas.microsoft.com/office/drawing/2014/main" id="{BA2278E8-C3A6-40B3-A725-8EE6DDDA0097}"/>
+              </a:ext>
+            </a:extLst>
+          </p:cNvPr>
+          <p:cNvPicPr>
+            <a:picLocks noChangeAspect="1"/>
+          </p:cNvPicPr>
+          <p:nvPr/>
+        </p:nvPicPr>
+        <p:blipFill>
+          <a:blip r:embed="rId2"/>
+          <a:stretch>
+            <a:fillRect/>
+          </a:stretch>
+        </p:blipFill>
+        <p:spPr>
+          <a:xfrm>
+            <a:off x="1275659" y="1439068"/>
+            <a:ext cx="6592682" cy="3979863"/>
+          </a:xfrm>
+          <a:prstGeom prst="rect">
+            <a:avLst/>
+          </a:prstGeom>
+        </p:spPr>
+      </p:pic>
+    </p:spTree>
+    <p:extLst>
+      <p:ext uri="{BB962C8B-B14F-4D97-AF65-F5344CB8AC3E}">
+        <p14:creationId xmlns:p14="http://schemas.microsoft.com/office/powerpoint/2010/main" val="3956834863"/>
       </p:ext>
     </p:extLst>
   </p:cSld>
@@ -11053,18 +10705,18 @@
 </file>
 
 <file path=customXml/item1.xml><?xml version="1.0" encoding="utf-8"?>
+<p:properties xmlns:p="http://schemas.microsoft.com/office/2006/metadata/properties" xmlns:xsi="http://www.w3.org/2001/XMLSchema-instance" xmlns:pc="http://schemas.microsoft.com/office/infopath/2007/PartnerControls">
+  <documentManagement/>
+</p:properties>
+</file>
+
+<file path=customXml/item2.xml><?xml version="1.0" encoding="utf-8"?>
 <?mso-contentType ?>
 <FormTemplates xmlns="http://schemas.microsoft.com/sharepoint/v3/contenttype/forms">
   <Display>DocumentLibraryForm</Display>
   <Edit>DocumentLibraryForm</Edit>
   <New>DocumentLibraryForm</New>
 </FormTemplates>
-</file>
-
-<file path=customXml/item2.xml><?xml version="1.0" encoding="utf-8"?>
-<p:properties xmlns:p="http://schemas.microsoft.com/office/2006/metadata/properties" xmlns:xsi="http://www.w3.org/2001/XMLSchema-instance" xmlns:pc="http://schemas.microsoft.com/office/infopath/2007/PartnerControls">
-  <documentManagement/>
-</p:properties>
 </file>
 
 <file path=customXml/item3.xml><?xml version="1.0" encoding="utf-8"?>
@@ -11182,18 +10834,18 @@
 </file>
 
 <file path=customXml/itemProps1.xml><?xml version="1.0" encoding="utf-8"?>
-<ds:datastoreItem xmlns:ds="http://schemas.openxmlformats.org/officeDocument/2006/customXml" ds:itemID="{AF2F9DA8-E6EE-4A55-B1BF-8F222A7179D9}">
+<ds:datastoreItem xmlns:ds="http://schemas.openxmlformats.org/officeDocument/2006/customXml" ds:itemID="{17BC7EFF-F6A5-46A1-B973-BC543C86928B}">
   <ds:schemaRefs>
-    <ds:schemaRef ds:uri="http://schemas.microsoft.com/sharepoint/v3/contenttype/forms"/>
+    <ds:schemaRef ds:uri="http://schemas.microsoft.com/office/2006/metadata/properties"/>
+    <ds:schemaRef ds:uri="http://schemas.microsoft.com/office/infopath/2007/PartnerControls"/>
   </ds:schemaRefs>
 </ds:datastoreItem>
 </file>
 
 <file path=customXml/itemProps2.xml><?xml version="1.0" encoding="utf-8"?>
-<ds:datastoreItem xmlns:ds="http://schemas.openxmlformats.org/officeDocument/2006/customXml" ds:itemID="{17BC7EFF-F6A5-46A1-B973-BC543C86928B}">
+<ds:datastoreItem xmlns:ds="http://schemas.openxmlformats.org/officeDocument/2006/customXml" ds:itemID="{AF2F9DA8-E6EE-4A55-B1BF-8F222A7179D9}">
   <ds:schemaRefs>
-    <ds:schemaRef ds:uri="http://schemas.microsoft.com/office/2006/metadata/properties"/>
-    <ds:schemaRef ds:uri="http://schemas.microsoft.com/office/infopath/2007/PartnerControls"/>
+    <ds:schemaRef ds:uri="http://schemas.microsoft.com/sharepoint/v3/contenttype/forms"/>
   </ds:schemaRefs>
 </ds:datastoreItem>
 </file>

</xml_diff>

<commit_message>
Ultima actualiazacion Seguridad (PPT y Word)
</commit_message>
<xml_diff>
--- a/trabajos.inacap.2019/Seguridad y auditoria informática/Unidad 2/Problematica - Empresa JetBlack II.pptx
+++ b/trabajos.inacap.2019/Seguridad y auditoria informática/Unidad 2/Problematica - Empresa JetBlack II.pptx
@@ -21,7 +21,7 @@
     <p:sldId id="265" r:id="rId15"/>
     <p:sldId id="270" r:id="rId16"/>
     <p:sldId id="271" r:id="rId17"/>
-    <p:sldId id="266" r:id="rId18"/>
+    <p:sldId id="276" r:id="rId18"/>
   </p:sldIdLst>
   <p:sldSz cx="9144000" cy="6858000" type="screen4x3"/>
   <p:notesSz cx="6858000" cy="9144000"/>
@@ -666,6 +666,90 @@
     <p:extLst>
       <p:ext uri="{BB962C8B-B14F-4D97-AF65-F5344CB8AC3E}">
         <p14:creationId xmlns:p14="http://schemas.microsoft.com/office/powerpoint/2010/main" val="946217838"/>
+      </p:ext>
+    </p:extLst>
+  </p:cSld>
+  <p:clrMapOvr>
+    <a:masterClrMapping/>
+  </p:clrMapOvr>
+</p:notes>
+</file>
+
+<file path=ppt/notesSlides/notesSlide3.xml><?xml version="1.0" encoding="utf-8"?>
+<p:notes xmlns:a="http://schemas.openxmlformats.org/drawingml/2006/main" xmlns:r="http://schemas.openxmlformats.org/officeDocument/2006/relationships" xmlns:p="http://schemas.openxmlformats.org/presentationml/2006/main">
+  <p:cSld>
+    <p:spTree>
+      <p:nvGrpSpPr>
+        <p:cNvPr id="1" name=""/>
+        <p:cNvGrpSpPr/>
+        <p:nvPr/>
+      </p:nvGrpSpPr>
+      <p:grpSpPr>
+        <a:xfrm>
+          <a:off x="0" y="0"/>
+          <a:ext cx="0" cy="0"/>
+          <a:chOff x="0" y="0"/>
+          <a:chExt cx="0" cy="0"/>
+        </a:xfrm>
+      </p:grpSpPr>
+      <p:sp>
+        <p:nvSpPr>
+          <p:cNvPr id="2" name="Marcador de imagen de diapositiva 1"/>
+          <p:cNvSpPr>
+            <a:spLocks noGrp="1" noRot="1" noChangeAspect="1"/>
+          </p:cNvSpPr>
+          <p:nvPr>
+            <p:ph type="sldImg"/>
+          </p:nvPr>
+        </p:nvSpPr>
+        <p:spPr/>
+      </p:sp>
+      <p:sp>
+        <p:nvSpPr>
+          <p:cNvPr id="3" name="Marcador de notas 2"/>
+          <p:cNvSpPr>
+            <a:spLocks noGrp="1"/>
+          </p:cNvSpPr>
+          <p:nvPr>
+            <p:ph type="body" idx="1"/>
+          </p:nvPr>
+        </p:nvSpPr>
+        <p:spPr/>
+        <p:txBody>
+          <a:bodyPr/>
+          <a:lstStyle/>
+          <a:p>
+            <a:endParaRPr lang="es-CL"/>
+          </a:p>
+        </p:txBody>
+      </p:sp>
+      <p:sp>
+        <p:nvSpPr>
+          <p:cNvPr id="4" name="Marcador de número de diapositiva 3"/>
+          <p:cNvSpPr>
+            <a:spLocks noGrp="1"/>
+          </p:cNvSpPr>
+          <p:nvPr>
+            <p:ph type="sldNum" sz="quarter" idx="10"/>
+          </p:nvPr>
+        </p:nvSpPr>
+        <p:spPr/>
+        <p:txBody>
+          <a:bodyPr/>
+          <a:lstStyle/>
+          <a:p>
+            <a:fld id="{31524595-A612-427C-89B0-BCF49485A725}" type="slidenum">
+              <a:rPr lang="es-CL" smtClean="0"/>
+              <a:t>13</a:t>
+            </a:fld>
+            <a:endParaRPr lang="es-CL"/>
+          </a:p>
+        </p:txBody>
+      </p:sp>
+    </p:spTree>
+    <p:extLst>
+      <p:ext uri="{BB962C8B-B14F-4D97-AF65-F5344CB8AC3E}">
+        <p14:creationId xmlns:p14="http://schemas.microsoft.com/office/powerpoint/2010/main" val="1382096673"/>
       </p:ext>
     </p:extLst>
   </p:cSld>
@@ -8147,13 +8231,13 @@
             <a:spLocks noGrp="1"/>
           </p:cNvSpPr>
           <p:nvPr>
-            <p:ph type="title"/>
+            <p:ph type="ctrTitle"/>
           </p:nvPr>
         </p:nvSpPr>
         <p:spPr>
           <a:xfrm>
-            <a:off x="259354" y="385487"/>
-            <a:ext cx="4035059" cy="436746"/>
+            <a:off x="1196788" y="1268567"/>
+            <a:ext cx="6575612" cy="1305603"/>
           </a:xfrm>
         </p:spPr>
         <p:txBody>
@@ -8161,20 +8245,63 @@
           <a:lstStyle/>
           <a:p>
             <a:r>
-              <a:rPr lang="es-CL" sz="2400" b="1" dirty="0">
-                <a:solidFill>
-                  <a:srgbClr val="E30513"/>
-                </a:solidFill>
+              <a:rPr lang="es-ES" sz="3200" b="1" dirty="0">
                 <a:latin typeface="+mn-lt"/>
               </a:rPr>
-              <a:t>Referencias bibliográficas</a:t>
-            </a:r>
-          </a:p>
-        </p:txBody>
-      </p:sp>
-      <p:sp>
-        <p:nvSpPr>
-          <p:cNvPr id="89" name="Título 1"/>
+              <a:t>Herramientas, Planes y Políticas de Seguridad </a:t>
+            </a:r>
+          </a:p>
+        </p:txBody>
+      </p:sp>
+      <p:sp>
+        <p:nvSpPr>
+          <p:cNvPr id="3" name="Subtítulo 2"/>
+          <p:cNvSpPr>
+            <a:spLocks noGrp="1"/>
+          </p:cNvSpPr>
+          <p:nvPr>
+            <p:ph type="subTitle" idx="1"/>
+          </p:nvPr>
+        </p:nvSpPr>
+        <p:spPr>
+          <a:xfrm>
+            <a:off x="1371600" y="3478000"/>
+            <a:ext cx="6400800" cy="530679"/>
+          </a:xfrm>
+        </p:spPr>
+        <p:txBody>
+          <a:bodyPr>
+            <a:noAutofit/>
+          </a:bodyPr>
+          <a:lstStyle/>
+          <a:p>
+            <a:r>
+              <a:rPr lang="es-ES" sz="2000" b="1" dirty="0">
+                <a:latin typeface="+mn-lt"/>
+              </a:rPr>
+              <a:t>Unidad 2 : Blue </a:t>
+            </a:r>
+            <a:r>
+              <a:rPr lang="es-ES" sz="2000" b="1" dirty="0" err="1">
+                <a:latin typeface="+mn-lt"/>
+              </a:rPr>
+              <a:t>Team</a:t>
+            </a:r>
+            <a:r>
+              <a:rPr lang="es-ES" sz="2000" b="1" dirty="0">
+                <a:latin typeface="+mn-lt"/>
+              </a:rPr>
+              <a:t>: Herramientas, Planes Y Políticas De Seguridad</a:t>
+            </a:r>
+            <a:endParaRPr lang="es-CL" sz="2000" b="1" dirty="0">
+              <a:latin typeface="+mn-lt"/>
+            </a:endParaRPr>
+          </a:p>
+        </p:txBody>
+      </p:sp>
+      <p:sp>
+        <p:nvSpPr>
+          <p:cNvPr id="4" name="Subtítulo 2"/>
           <p:cNvSpPr txBox="1">
             <a:spLocks/>
           </p:cNvSpPr>
@@ -8182,130 +8309,205 @@
         </p:nvSpPr>
         <p:spPr>
           <a:xfrm>
-            <a:off x="391887" y="1118507"/>
-            <a:ext cx="8319406" cy="5021036"/>
+            <a:off x="1310258" y="4901650"/>
+            <a:ext cx="7137055" cy="1162036"/>
           </a:xfrm>
           <a:prstGeom prst="rect">
             <a:avLst/>
           </a:prstGeom>
+          <a:noFill/>
         </p:spPr>
         <p:txBody>
-          <a:bodyPr vert="horz" lIns="91440" tIns="45720" rIns="91440" bIns="45720" rtlCol="0" anchor="t">
+          <a:bodyPr vert="horz" lIns="91440" tIns="45720" rIns="91440" bIns="45720" rtlCol="0">
             <a:noAutofit/>
           </a:bodyPr>
           <a:lstStyle>
-            <a:lvl1pPr algn="l" defTabSz="457200" rtl="0" eaLnBrk="1" latinLnBrk="0" hangingPunct="1">
+            <a:lvl1pPr marL="0" indent="0" algn="ctr" defTabSz="457200" rtl="0" eaLnBrk="1" latinLnBrk="0" hangingPunct="1">
               <a:spcBef>
-                <a:spcPct val="0"/>
+                <a:spcPct val="20000"/>
               </a:spcBef>
-              <a:buNone/>
-              <a:defRPr sz="3600" kern="1200">
+              <a:buFont typeface="Arial"/>
+              <a:buNone/>
+              <a:defRPr sz="2400" kern="1200">
                 <a:solidFill>
-                  <a:srgbClr val="FF0000"/>
+                  <a:srgbClr val="FFFFFF"/>
                 </a:solidFill>
                 <a:latin typeface="Myriad Pro"/>
-                <a:ea typeface="+mj-ea"/>
+                <a:ea typeface="+mn-ea"/>
                 <a:cs typeface="Myriad Pro"/>
               </a:defRPr>
             </a:lvl1pPr>
-          </a:lstStyle>
-          <a:p>
-            <a:pPr marL="901700" lvl="0" indent="-901700">
-              <a:lnSpc>
-                <a:spcPct val="200000"/>
-              </a:lnSpc>
-            </a:pPr>
-            <a:r>
-              <a:rPr lang="es-CL" sz="2000" dirty="0">
+            <a:lvl2pPr marL="457200" indent="0" algn="ctr" defTabSz="457200" rtl="0" eaLnBrk="1" latinLnBrk="0" hangingPunct="1">
+              <a:spcBef>
+                <a:spcPct val="20000"/>
+              </a:spcBef>
+              <a:buFont typeface="Arial"/>
+              <a:buNone/>
+              <a:defRPr sz="2000" kern="1200">
                 <a:solidFill>
                   <a:schemeClr val="tx1">
-                    <a:lumMod val="75000"/>
-                    <a:lumOff val="25000"/>
+                    <a:tint val="75000"/>
+                  </a:schemeClr>
+                </a:solidFill>
+                <a:latin typeface="Myriad Pro"/>
+                <a:ea typeface="+mn-ea"/>
+                <a:cs typeface="Myriad Pro"/>
+              </a:defRPr>
+            </a:lvl2pPr>
+            <a:lvl3pPr marL="914400" indent="0" algn="ctr" defTabSz="457200" rtl="0" eaLnBrk="1" latinLnBrk="0" hangingPunct="1">
+              <a:spcBef>
+                <a:spcPct val="20000"/>
+              </a:spcBef>
+              <a:buFont typeface="Arial"/>
+              <a:buNone/>
+              <a:defRPr sz="1800" kern="1200">
+                <a:solidFill>
+                  <a:schemeClr val="tx1">
+                    <a:tint val="75000"/>
+                  </a:schemeClr>
+                </a:solidFill>
+                <a:latin typeface="Myriad Pro"/>
+                <a:ea typeface="+mn-ea"/>
+                <a:cs typeface="Myriad Pro"/>
+              </a:defRPr>
+            </a:lvl3pPr>
+            <a:lvl4pPr marL="1371600" indent="0" algn="ctr" defTabSz="457200" rtl="0" eaLnBrk="1" latinLnBrk="0" hangingPunct="1">
+              <a:spcBef>
+                <a:spcPct val="20000"/>
+              </a:spcBef>
+              <a:buFont typeface="Arial"/>
+              <a:buNone/>
+              <a:defRPr sz="1600" kern="1200">
+                <a:solidFill>
+                  <a:schemeClr val="tx1">
+                    <a:tint val="75000"/>
+                  </a:schemeClr>
+                </a:solidFill>
+                <a:latin typeface="Myriad Pro"/>
+                <a:ea typeface="+mn-ea"/>
+                <a:cs typeface="Myriad Pro"/>
+              </a:defRPr>
+            </a:lvl4pPr>
+            <a:lvl5pPr marL="1828800" indent="0" algn="ctr" defTabSz="457200" rtl="0" eaLnBrk="1" latinLnBrk="0" hangingPunct="1">
+              <a:spcBef>
+                <a:spcPct val="20000"/>
+              </a:spcBef>
+              <a:buFont typeface="Arial"/>
+              <a:buNone/>
+              <a:defRPr sz="1600" kern="1200">
+                <a:solidFill>
+                  <a:schemeClr val="tx1">
+                    <a:tint val="75000"/>
+                  </a:schemeClr>
+                </a:solidFill>
+                <a:latin typeface="Myriad Pro"/>
+                <a:ea typeface="+mn-ea"/>
+                <a:cs typeface="Myriad Pro"/>
+              </a:defRPr>
+            </a:lvl5pPr>
+            <a:lvl6pPr marL="2286000" indent="0" algn="ctr" defTabSz="457200" rtl="0" eaLnBrk="1" latinLnBrk="0" hangingPunct="1">
+              <a:spcBef>
+                <a:spcPct val="20000"/>
+              </a:spcBef>
+              <a:buFont typeface="Arial"/>
+              <a:buNone/>
+              <a:defRPr sz="2000" kern="1200">
+                <a:solidFill>
+                  <a:schemeClr val="tx1">
+                    <a:tint val="75000"/>
                   </a:schemeClr>
                 </a:solidFill>
                 <a:latin typeface="+mn-lt"/>
-              </a:rPr>
-              <a:t>Listar los documentos consultados de acuerdo a Norma APA 6° versión (sangría francesa y doble espacio).</a:t>
-            </a:r>
-          </a:p>
-          <a:p>
-            <a:pPr marL="901700" indent="-901700">
-              <a:lnSpc>
-                <a:spcPct val="200000"/>
-              </a:lnSpc>
-            </a:pPr>
-            <a:r>
-              <a:rPr lang="es-CL" sz="2000" dirty="0">
+                <a:ea typeface="+mn-ea"/>
+                <a:cs typeface="+mn-cs"/>
+              </a:defRPr>
+            </a:lvl6pPr>
+            <a:lvl7pPr marL="2743200" indent="0" algn="ctr" defTabSz="457200" rtl="0" eaLnBrk="1" latinLnBrk="0" hangingPunct="1">
+              <a:spcBef>
+                <a:spcPct val="20000"/>
+              </a:spcBef>
+              <a:buFont typeface="Arial"/>
+              <a:buNone/>
+              <a:defRPr sz="2000" kern="1200">
                 <a:solidFill>
                   <a:schemeClr val="tx1">
-                    <a:lumMod val="75000"/>
-                    <a:lumOff val="25000"/>
+                    <a:tint val="75000"/>
                   </a:schemeClr>
                 </a:solidFill>
                 <a:latin typeface="+mn-lt"/>
+                <a:ea typeface="+mn-ea"/>
+                <a:cs typeface="+mn-cs"/>
+              </a:defRPr>
+            </a:lvl7pPr>
+            <a:lvl8pPr marL="3200400" indent="0" algn="ctr" defTabSz="457200" rtl="0" eaLnBrk="1" latinLnBrk="0" hangingPunct="1">
+              <a:spcBef>
+                <a:spcPct val="20000"/>
+              </a:spcBef>
+              <a:buFont typeface="Arial"/>
+              <a:buNone/>
+              <a:defRPr sz="2000" kern="1200">
+                <a:solidFill>
+                  <a:schemeClr val="tx1">
+                    <a:tint val="75000"/>
+                  </a:schemeClr>
+                </a:solidFill>
+                <a:latin typeface="+mn-lt"/>
+                <a:ea typeface="+mn-ea"/>
+                <a:cs typeface="+mn-cs"/>
+              </a:defRPr>
+            </a:lvl8pPr>
+            <a:lvl9pPr marL="3657600" indent="0" algn="ctr" defTabSz="457200" rtl="0" eaLnBrk="1" latinLnBrk="0" hangingPunct="1">
+              <a:spcBef>
+                <a:spcPct val="20000"/>
+              </a:spcBef>
+              <a:buFont typeface="Arial"/>
+              <a:buNone/>
+              <a:defRPr sz="2000" kern="1200">
+                <a:solidFill>
+                  <a:schemeClr val="tx1">
+                    <a:tint val="75000"/>
+                  </a:schemeClr>
+                </a:solidFill>
+                <a:latin typeface="+mn-lt"/>
+                <a:ea typeface="+mn-ea"/>
+                <a:cs typeface="+mn-cs"/>
+              </a:defRPr>
+            </a:lvl9pPr>
+          </a:lstStyle>
+          <a:p>
+            <a:pPr algn="l"/>
+            <a:r>
+              <a:rPr lang="es-CL" sz="1600" dirty="0">
+                <a:latin typeface="+mn-lt"/>
               </a:rPr>
-              <a:t>Listar los documentos consultados de acuerdo a Norma APA 6° versión (sangría francesa y doble espacio).</a:t>
-            </a:r>
-          </a:p>
-          <a:p>
-            <a:pPr marL="901700" lvl="0" indent="-901700">
-              <a:lnSpc>
-                <a:spcPct val="200000"/>
-              </a:lnSpc>
-            </a:pPr>
-            <a:endParaRPr lang="es-CL" sz="2000" dirty="0">
-              <a:solidFill>
-                <a:schemeClr val="tx1">
-                  <a:lumMod val="75000"/>
-                  <a:lumOff val="25000"/>
-                </a:schemeClr>
-              </a:solidFill>
-              <a:latin typeface="+mn-lt"/>
-            </a:endParaRPr>
-          </a:p>
-        </p:txBody>
-      </p:sp>
-      <p:sp>
-        <p:nvSpPr>
-          <p:cNvPr id="3" name="Marcador de número de diapositiva 2"/>
-          <p:cNvSpPr>
-            <a:spLocks noGrp="1"/>
-          </p:cNvSpPr>
-          <p:nvPr>
-            <p:ph type="sldNum" sz="quarter" idx="12"/>
-          </p:nvPr>
-        </p:nvSpPr>
-        <p:spPr/>
-        <p:txBody>
-          <a:bodyPr/>
-          <a:lstStyle/>
-          <a:p>
-            <a:fld id="{C0F9E0D3-51B3-8D47-9FA0-6C6BA96BAD74}" type="slidenum">
-              <a:rPr lang="es-ES" smtClean="0"/>
-              <a:t>13</a:t>
-            </a:fld>
-            <a:endParaRPr lang="es-ES"/>
-          </a:p>
-        </p:txBody>
-      </p:sp>
-      <p:sp>
-        <p:nvSpPr>
-          <p:cNvPr id="4" name="Marcador de pie de página 3"/>
-          <p:cNvSpPr>
-            <a:spLocks noGrp="1"/>
-          </p:cNvSpPr>
-          <p:nvPr>
-            <p:ph type="ftr" sz="quarter" idx="11"/>
-          </p:nvPr>
-        </p:nvSpPr>
-        <p:spPr/>
-        <p:txBody>
-          <a:bodyPr/>
-          <a:lstStyle/>
-          <a:p>
-            <a:r>
-              <a:rPr lang="es-ES" dirty="0"/>
-              <a:t>Informática y Telecomunicaciones | Seguridad y Auditoría Informática</a:t>
+              <a:t>Nombre de asignatura: Seguridad y Auditoría Informática.</a:t>
+            </a:r>
+          </a:p>
+          <a:p>
+            <a:pPr algn="l"/>
+            <a:r>
+              <a:rPr lang="es-CL" sz="1600" dirty="0">
+                <a:latin typeface="+mn-lt"/>
+              </a:rPr>
+              <a:t>Nombre integrantes del grupo: Ivo Olivares, Felipe Inda, Aron Fuentes.</a:t>
+            </a:r>
+          </a:p>
+          <a:p>
+            <a:pPr algn="l"/>
+            <a:r>
+              <a:rPr lang="es-CL" sz="1600" dirty="0">
+                <a:latin typeface="+mn-lt"/>
+              </a:rPr>
+              <a:t>Nombre carrera: Ingeniería en informática.</a:t>
+            </a:r>
+          </a:p>
+          <a:p>
+            <a:pPr algn="l"/>
+            <a:r>
+              <a:rPr lang="es-CL" sz="1600" dirty="0">
+                <a:latin typeface="+mn-lt"/>
+              </a:rPr>
+              <a:t>Fecha exposición: 13 de mayo del 2019</a:t>
             </a:r>
           </a:p>
         </p:txBody>
@@ -8313,7 +8515,7 @@
     </p:spTree>
     <p:extLst>
       <p:ext uri="{BB962C8B-B14F-4D97-AF65-F5344CB8AC3E}">
-        <p14:creationId xmlns:p14="http://schemas.microsoft.com/office/powerpoint/2010/main" val="4224773177"/>
+        <p14:creationId xmlns:p14="http://schemas.microsoft.com/office/powerpoint/2010/main" val="811627228"/>
       </p:ext>
     </p:extLst>
   </p:cSld>
@@ -9041,6 +9243,95 @@
             <a:r>
               <a:rPr lang="es-ES" dirty="0"/>
               <a:t>Informática y Telecomunicaciones | Seguridad y Auditoría Informática</a:t>
+            </a:r>
+          </a:p>
+        </p:txBody>
+      </p:sp>
+      <p:pic>
+        <p:nvPicPr>
+          <p:cNvPr id="5" name="Imagen 4">
+            <a:extLst>
+              <a:ext uri="{FF2B5EF4-FFF2-40B4-BE49-F238E27FC236}">
+                <a16:creationId xmlns:a16="http://schemas.microsoft.com/office/drawing/2014/main" id="{7DC32CE5-9891-433D-874A-D6EEDD82AA46}"/>
+              </a:ext>
+            </a:extLst>
+          </p:cNvPr>
+          <p:cNvPicPr>
+            <a:picLocks noChangeAspect="1"/>
+          </p:cNvPicPr>
+          <p:nvPr/>
+        </p:nvPicPr>
+        <p:blipFill>
+          <a:blip r:embed="rId2"/>
+          <a:stretch>
+            <a:fillRect/>
+          </a:stretch>
+        </p:blipFill>
+        <p:spPr>
+          <a:xfrm>
+            <a:off x="259354" y="1428750"/>
+            <a:ext cx="4752975" cy="4000500"/>
+          </a:xfrm>
+          <a:prstGeom prst="rect">
+            <a:avLst/>
+          </a:prstGeom>
+        </p:spPr>
+      </p:pic>
+      <p:sp>
+        <p:nvSpPr>
+          <p:cNvPr id="6" name="CuadroTexto 5">
+            <a:extLst>
+              <a:ext uri="{FF2B5EF4-FFF2-40B4-BE49-F238E27FC236}">
+                <a16:creationId xmlns:a16="http://schemas.microsoft.com/office/drawing/2014/main" id="{50D7584D-E817-474A-86C7-62E307302A9A}"/>
+              </a:ext>
+            </a:extLst>
+          </p:cNvPr>
+          <p:cNvSpPr txBox="1"/>
+          <p:nvPr/>
+        </p:nvSpPr>
+        <p:spPr>
+          <a:xfrm>
+            <a:off x="4702629" y="2921168"/>
+            <a:ext cx="4182017" cy="1015663"/>
+          </a:xfrm>
+          <a:prstGeom prst="rect">
+            <a:avLst/>
+          </a:prstGeom>
+          <a:noFill/>
+        </p:spPr>
+        <p:txBody>
+          <a:bodyPr wrap="square" rtlCol="0">
+            <a:spAutoFit/>
+          </a:bodyPr>
+          <a:lstStyle/>
+          <a:p>
+            <a:pPr marL="342900" indent="-342900">
+              <a:buFont typeface="Arial" panose="020B0604020202020204" pitchFamily="34" charset="0"/>
+              <a:buChar char="•"/>
+            </a:pPr>
+            <a:r>
+              <a:rPr lang="es-ES" sz="2000" dirty="0"/>
+              <a:t>La Sanción penal. </a:t>
+            </a:r>
+          </a:p>
+          <a:p>
+            <a:pPr marL="342900" indent="-342900">
+              <a:buFont typeface="Arial" panose="020B0604020202020204" pitchFamily="34" charset="0"/>
+              <a:buChar char="•"/>
+            </a:pPr>
+            <a:r>
+              <a:rPr lang="es-ES" sz="2000" dirty="0"/>
+              <a:t>La Responsabilidad administrativa.</a:t>
+            </a:r>
+          </a:p>
+          <a:p>
+            <a:pPr marL="342900" indent="-342900">
+              <a:buFont typeface="Arial" panose="020B0604020202020204" pitchFamily="34" charset="0"/>
+              <a:buChar char="•"/>
+            </a:pPr>
+            <a:r>
+              <a:rPr lang="es-ES" sz="2000" dirty="0"/>
+              <a:t>La Responsabilidad civil.</a:t>
             </a:r>
           </a:p>
         </p:txBody>
@@ -10705,21 +10996,6 @@
 </file>
 
 <file path=customXml/item1.xml><?xml version="1.0" encoding="utf-8"?>
-<p:properties xmlns:p="http://schemas.microsoft.com/office/2006/metadata/properties" xmlns:xsi="http://www.w3.org/2001/XMLSchema-instance" xmlns:pc="http://schemas.microsoft.com/office/infopath/2007/PartnerControls">
-  <documentManagement/>
-</p:properties>
-</file>
-
-<file path=customXml/item2.xml><?xml version="1.0" encoding="utf-8"?>
-<?mso-contentType ?>
-<FormTemplates xmlns="http://schemas.microsoft.com/sharepoint/v3/contenttype/forms">
-  <Display>DocumentLibraryForm</Display>
-  <Edit>DocumentLibraryForm</Edit>
-  <New>DocumentLibraryForm</New>
-</FormTemplates>
-</file>
-
-<file path=customXml/item3.xml><?xml version="1.0" encoding="utf-8"?>
 <ct:contentTypeSchema xmlns:ct="http://schemas.microsoft.com/office/2006/metadata/contentType" xmlns:ma="http://schemas.microsoft.com/office/2006/metadata/properties/metaAttributes" ct:_="" ma:_="" ma:contentTypeName="Documento" ma:contentTypeID="0x0101000F4758918AE592448477A0AA5DA5229B" ma:contentTypeVersion="0" ma:contentTypeDescription="Crear nuevo documento." ma:contentTypeScope="" ma:versionID="4712974915117db248daa0568bea06ff">
   <xsd:schema xmlns:xsd="http://www.w3.org/2001/XMLSchema" xmlns:xs="http://www.w3.org/2001/XMLSchema" xmlns:p="http://schemas.microsoft.com/office/2006/metadata/properties" targetNamespace="http://schemas.microsoft.com/office/2006/metadata/properties" ma:root="true" ma:fieldsID="3f6edc329ff236629c56e3b879b320d0">
     <xsd:element name="properties">
@@ -10833,10 +11109,32 @@
 </ct:contentTypeSchema>
 </file>
 
+<file path=customXml/item2.xml><?xml version="1.0" encoding="utf-8"?>
+<?mso-contentType ?>
+<FormTemplates xmlns="http://schemas.microsoft.com/sharepoint/v3/contenttype/forms">
+  <Display>DocumentLibraryForm</Display>
+  <Edit>DocumentLibraryForm</Edit>
+  <New>DocumentLibraryForm</New>
+</FormTemplates>
+</file>
+
+<file path=customXml/item3.xml><?xml version="1.0" encoding="utf-8"?>
+<p:properties xmlns:p="http://schemas.microsoft.com/office/2006/metadata/properties" xmlns:xsi="http://www.w3.org/2001/XMLSchema-instance" xmlns:pc="http://schemas.microsoft.com/office/infopath/2007/PartnerControls">
+  <documentManagement/>
+</p:properties>
+</file>
+
 <file path=customXml/itemProps1.xml><?xml version="1.0" encoding="utf-8"?>
-<ds:datastoreItem xmlns:ds="http://schemas.openxmlformats.org/officeDocument/2006/customXml" ds:itemID="{17BC7EFF-F6A5-46A1-B973-BC543C86928B}">
+<ds:datastoreItem xmlns:ds="http://schemas.openxmlformats.org/officeDocument/2006/customXml" ds:itemID="{7ACA9EC1-A498-469E-9FAB-CE090C2E0E75}">
   <ds:schemaRefs>
+    <ds:schemaRef ds:uri="http://schemas.microsoft.com/office/2006/metadata/contentType"/>
+    <ds:schemaRef ds:uri="http://schemas.microsoft.com/office/2006/metadata/properties/metaAttributes"/>
+    <ds:schemaRef ds:uri="http://www.w3.org/2001/XMLSchema"/>
     <ds:schemaRef ds:uri="http://schemas.microsoft.com/office/2006/metadata/properties"/>
+    <ds:schemaRef ds:uri="http://schemas.openxmlformats.org/package/2006/metadata/core-properties"/>
+    <ds:schemaRef ds:uri="http://purl.org/dc/elements/1.1/"/>
+    <ds:schemaRef ds:uri="http://purl.org/dc/terms/"/>
+    <ds:schemaRef ds:uri="http://schemas.microsoft.com/internal/obd"/>
     <ds:schemaRef ds:uri="http://schemas.microsoft.com/office/infopath/2007/PartnerControls"/>
   </ds:schemaRefs>
 </ds:datastoreItem>
@@ -10851,16 +11149,9 @@
 </file>
 
 <file path=customXml/itemProps3.xml><?xml version="1.0" encoding="utf-8"?>
-<ds:datastoreItem xmlns:ds="http://schemas.openxmlformats.org/officeDocument/2006/customXml" ds:itemID="{7ACA9EC1-A498-469E-9FAB-CE090C2E0E75}">
+<ds:datastoreItem xmlns:ds="http://schemas.openxmlformats.org/officeDocument/2006/customXml" ds:itemID="{17BC7EFF-F6A5-46A1-B973-BC543C86928B}">
   <ds:schemaRefs>
-    <ds:schemaRef ds:uri="http://schemas.microsoft.com/office/2006/metadata/contentType"/>
-    <ds:schemaRef ds:uri="http://schemas.microsoft.com/office/2006/metadata/properties/metaAttributes"/>
-    <ds:schemaRef ds:uri="http://www.w3.org/2001/XMLSchema"/>
     <ds:schemaRef ds:uri="http://schemas.microsoft.com/office/2006/metadata/properties"/>
-    <ds:schemaRef ds:uri="http://schemas.openxmlformats.org/package/2006/metadata/core-properties"/>
-    <ds:schemaRef ds:uri="http://purl.org/dc/elements/1.1/"/>
-    <ds:schemaRef ds:uri="http://purl.org/dc/terms/"/>
-    <ds:schemaRef ds:uri="http://schemas.microsoft.com/internal/obd"/>
     <ds:schemaRef ds:uri="http://schemas.microsoft.com/office/infopath/2007/PartnerControls"/>
   </ds:schemaRefs>
 </ds:datastoreItem>

</xml_diff>